<commit_message>
Clase Jueves, Semana 4
</commit_message>
<xml_diff>
--- a/Semana 4/Presentación.pptx
+++ b/Semana 4/Presentación.pptx
@@ -5,7 +5,7 @@
     <p:sldMasterId id="2147483672" r:id="rId1"/>
   </p:sldMasterIdLst>
   <p:notesMasterIdLst>
-    <p:notesMasterId r:id="rId7"/>
+    <p:notesMasterId r:id="rId18"/>
   </p:notesMasterIdLst>
   <p:sldIdLst>
     <p:sldId id="256" r:id="rId2"/>
@@ -13,6 +13,17 @@
     <p:sldId id="311" r:id="rId4"/>
     <p:sldId id="312" r:id="rId5"/>
     <p:sldId id="314" r:id="rId6"/>
+    <p:sldId id="316" r:id="rId7"/>
+    <p:sldId id="317" r:id="rId8"/>
+    <p:sldId id="318" r:id="rId9"/>
+    <p:sldId id="319" r:id="rId10"/>
+    <p:sldId id="320" r:id="rId11"/>
+    <p:sldId id="321" r:id="rId12"/>
+    <p:sldId id="322" r:id="rId13"/>
+    <p:sldId id="323" r:id="rId14"/>
+    <p:sldId id="324" r:id="rId15"/>
+    <p:sldId id="325" r:id="rId16"/>
+    <p:sldId id="326" r:id="rId17"/>
   </p:sldIdLst>
   <p:sldSz cx="12192000" cy="6858000"/>
   <p:notesSz cx="6858000" cy="9144000"/>
@@ -201,7 +212,7 @@
           <a:p>
             <a:fld id="{430AAACB-714D-4ED6-9BCD-E10DE1E326CF}" type="datetimeFigureOut">
               <a:rPr lang="es-CO" smtClean="0"/>
-              <a:t>12/02/2019</a:t>
+              <a:t>13/02/2019</a:t>
             </a:fld>
             <a:endParaRPr lang="es-CO"/>
           </a:p>
@@ -695,7 +706,7 @@
           <a:p>
             <a:fld id="{C214C790-AC43-4046-BAB7-879940BCF0AB}" type="datetimeFigureOut">
               <a:rPr lang="es-CO" smtClean="0"/>
-              <a:t>12/02/2019</a:t>
+              <a:t>13/02/2019</a:t>
             </a:fld>
             <a:endParaRPr lang="es-CO"/>
           </a:p>
@@ -903,7 +914,7 @@
           <a:p>
             <a:fld id="{C214C790-AC43-4046-BAB7-879940BCF0AB}" type="datetimeFigureOut">
               <a:rPr lang="es-CO" smtClean="0"/>
-              <a:t>12/02/2019</a:t>
+              <a:t>13/02/2019</a:t>
             </a:fld>
             <a:endParaRPr lang="es-CO"/>
           </a:p>
@@ -1159,7 +1170,7 @@
           <a:p>
             <a:fld id="{C214C790-AC43-4046-BAB7-879940BCF0AB}" type="datetimeFigureOut">
               <a:rPr lang="es-CO" smtClean="0"/>
-              <a:t>12/02/2019</a:t>
+              <a:t>13/02/2019</a:t>
             </a:fld>
             <a:endParaRPr lang="es-CO"/>
           </a:p>
@@ -1329,7 +1340,7 @@
           <a:p>
             <a:fld id="{C214C790-AC43-4046-BAB7-879940BCF0AB}" type="datetimeFigureOut">
               <a:rPr lang="es-CO" smtClean="0"/>
-              <a:t>12/02/2019</a:t>
+              <a:t>13/02/2019</a:t>
             </a:fld>
             <a:endParaRPr lang="es-CO"/>
           </a:p>
@@ -1672,7 +1683,7 @@
           <a:p>
             <a:fld id="{C214C790-AC43-4046-BAB7-879940BCF0AB}" type="datetimeFigureOut">
               <a:rPr lang="es-CO" smtClean="0"/>
-              <a:t>12/02/2019</a:t>
+              <a:t>13/02/2019</a:t>
             </a:fld>
             <a:endParaRPr lang="es-CO"/>
           </a:p>
@@ -1947,7 +1958,7 @@
           <a:p>
             <a:fld id="{C214C790-AC43-4046-BAB7-879940BCF0AB}" type="datetimeFigureOut">
               <a:rPr lang="es-CO" smtClean="0"/>
-              <a:t>12/02/2019</a:t>
+              <a:t>13/02/2019</a:t>
             </a:fld>
             <a:endParaRPr lang="es-CO"/>
           </a:p>
@@ -2326,7 +2337,7 @@
           <a:p>
             <a:fld id="{C214C790-AC43-4046-BAB7-879940BCF0AB}" type="datetimeFigureOut">
               <a:rPr lang="es-CO" smtClean="0"/>
-              <a:t>12/02/2019</a:t>
+              <a:t>13/02/2019</a:t>
             </a:fld>
             <a:endParaRPr lang="es-CO"/>
           </a:p>
@@ -2444,7 +2455,7 @@
           <a:p>
             <a:fld id="{C214C790-AC43-4046-BAB7-879940BCF0AB}" type="datetimeFigureOut">
               <a:rPr lang="es-CO" smtClean="0"/>
-              <a:t>12/02/2019</a:t>
+              <a:t>13/02/2019</a:t>
             </a:fld>
             <a:endParaRPr lang="es-CO"/>
           </a:p>
@@ -2615,7 +2626,7 @@
           <a:p>
             <a:fld id="{C214C790-AC43-4046-BAB7-879940BCF0AB}" type="datetimeFigureOut">
               <a:rPr lang="es-CO" smtClean="0"/>
-              <a:t>12/02/2019</a:t>
+              <a:t>13/02/2019</a:t>
             </a:fld>
             <a:endParaRPr lang="es-CO"/>
           </a:p>
@@ -2969,7 +2980,7 @@
           <a:p>
             <a:fld id="{C214C790-AC43-4046-BAB7-879940BCF0AB}" type="datetimeFigureOut">
               <a:rPr lang="es-CO" smtClean="0"/>
-              <a:t>12/02/2019</a:t>
+              <a:t>13/02/2019</a:t>
             </a:fld>
             <a:endParaRPr lang="es-CO"/>
           </a:p>
@@ -3346,7 +3357,7 @@
           <a:p>
             <a:fld id="{C214C790-AC43-4046-BAB7-879940BCF0AB}" type="datetimeFigureOut">
               <a:rPr lang="es-CO" smtClean="0"/>
-              <a:t>12/02/2019</a:t>
+              <a:t>13/02/2019</a:t>
             </a:fld>
             <a:endParaRPr lang="es-CO"/>
           </a:p>
@@ -3633,7 +3644,7 @@
           <a:p>
             <a:fld id="{C214C790-AC43-4046-BAB7-879940BCF0AB}" type="datetimeFigureOut">
               <a:rPr lang="es-CO" smtClean="0"/>
-              <a:t>12/02/2019</a:t>
+              <a:t>13/02/2019</a:t>
             </a:fld>
             <a:endParaRPr lang="es-CO"/>
           </a:p>
@@ -4174,11 +4185,7 @@
           <a:p>
             <a:r>
               <a:rPr lang="es-ES" smtClean="0"/>
-              <a:t>Semana </a:t>
-            </a:r>
-            <a:r>
-              <a:rPr lang="es-ES" smtClean="0"/>
-              <a:t>4</a:t>
+              <a:t>Semana 4</a:t>
             </a:r>
             <a:endParaRPr lang="es-CO" dirty="0"/>
           </a:p>
@@ -4223,6 +4230,2572 @@
       </p:par>
     </p:tnLst>
   </p:timing>
+</p:sld>
+</file>
+
+<file path=ppt/slides/slide10.xml><?xml version="1.0" encoding="utf-8"?>
+<p:sld xmlns:a="http://schemas.openxmlformats.org/drawingml/2006/main" xmlns:r="http://schemas.openxmlformats.org/officeDocument/2006/relationships" xmlns:p="http://schemas.openxmlformats.org/presentationml/2006/main">
+  <p:cSld>
+    <p:spTree>
+      <p:nvGrpSpPr>
+        <p:cNvPr id="1" name=""/>
+        <p:cNvGrpSpPr/>
+        <p:nvPr/>
+      </p:nvGrpSpPr>
+      <p:grpSpPr>
+        <a:xfrm>
+          <a:off x="0" y="0"/>
+          <a:ext cx="0" cy="0"/>
+          <a:chOff x="0" y="0"/>
+          <a:chExt cx="0" cy="0"/>
+        </a:xfrm>
+      </p:grpSpPr>
+      <p:sp>
+        <p:nvSpPr>
+          <p:cNvPr id="2" name="Título 1"/>
+          <p:cNvSpPr>
+            <a:spLocks noGrp="1"/>
+          </p:cNvSpPr>
+          <p:nvPr>
+            <p:ph type="title"/>
+          </p:nvPr>
+        </p:nvSpPr>
+        <p:spPr/>
+        <p:txBody>
+          <a:bodyPr/>
+          <a:lstStyle/>
+          <a:p>
+            <a:r>
+              <a:rPr lang="es-ES" dirty="0" smtClean="0"/>
+              <a:t>JSON</a:t>
+            </a:r>
+            <a:endParaRPr lang="es-CO" dirty="0"/>
+          </a:p>
+        </p:txBody>
+      </p:sp>
+      <p:sp>
+        <p:nvSpPr>
+          <p:cNvPr id="3" name="Marcador de contenido 2"/>
+          <p:cNvSpPr>
+            <a:spLocks noGrp="1"/>
+          </p:cNvSpPr>
+          <p:nvPr>
+            <p:ph idx="1"/>
+          </p:nvPr>
+        </p:nvSpPr>
+        <p:spPr>
+          <a:xfrm>
+            <a:off x="1097280" y="1845734"/>
+            <a:ext cx="5451004" cy="4023360"/>
+          </a:xfrm>
+        </p:spPr>
+        <p:txBody>
+          <a:bodyPr/>
+          <a:lstStyle/>
+          <a:p>
+            <a:r>
+              <a:rPr lang="es-ES" dirty="0" smtClean="0"/>
+              <a:t>JSON es un formato de intercambio de datos.</a:t>
+            </a:r>
+          </a:p>
+          <a:p>
+            <a:r>
+              <a:rPr lang="es-ES" dirty="0" smtClean="0"/>
+              <a:t>Puede representar objetos completos</a:t>
+            </a:r>
+          </a:p>
+          <a:p>
+            <a:r>
+              <a:rPr lang="es-ES" dirty="0" smtClean="0"/>
+              <a:t>Permite interoperabilidad entre equipos con distintas tecnologías, sistemas operativos y lenguajes de programación.</a:t>
+            </a:r>
+          </a:p>
+          <a:p>
+            <a:r>
+              <a:rPr lang="es-ES" dirty="0" smtClean="0"/>
+              <a:t>En la actualidad es el lenguaje de etiquetado más usual en los sistemas. Tanto que algunos lenguajes incorporan un intérprete e incluso Ruby </a:t>
+            </a:r>
+            <a:r>
+              <a:rPr lang="es-ES" dirty="0" err="1" smtClean="0"/>
+              <a:t>on</a:t>
+            </a:r>
+            <a:r>
+              <a:rPr lang="es-ES" dirty="0" smtClean="0"/>
+              <a:t> </a:t>
+            </a:r>
+            <a:r>
+              <a:rPr lang="es-ES" dirty="0" err="1" smtClean="0"/>
+              <a:t>rails</a:t>
+            </a:r>
+            <a:r>
+              <a:rPr lang="es-ES" dirty="0" smtClean="0"/>
+              <a:t> lo integra como tipo primitivo de dato.</a:t>
+            </a:r>
+            <a:endParaRPr lang="es-ES" dirty="0"/>
+          </a:p>
+        </p:txBody>
+      </p:sp>
+      <p:pic>
+        <p:nvPicPr>
+          <p:cNvPr id="1026" name="Picture 2" descr="Resultado de imagen para json"/>
+          <p:cNvPicPr>
+            <a:picLocks noChangeAspect="1" noChangeArrowheads="1"/>
+          </p:cNvPicPr>
+          <p:nvPr/>
+        </p:nvPicPr>
+        <p:blipFill>
+          <a:blip r:embed="rId2">
+            <a:extLst>
+              <a:ext uri="{28A0092B-C50C-407E-A947-70E740481C1C}">
+                <a14:useLocalDpi xmlns:a14="http://schemas.microsoft.com/office/drawing/2010/main" val="0"/>
+              </a:ext>
+            </a:extLst>
+          </a:blip>
+          <a:srcRect/>
+          <a:stretch>
+            <a:fillRect/>
+          </a:stretch>
+        </p:blipFill>
+        <p:spPr bwMode="auto">
+          <a:xfrm>
+            <a:off x="6866255" y="2543639"/>
+            <a:ext cx="4289425" cy="2237962"/>
+          </a:xfrm>
+          <a:prstGeom prst="rect">
+            <a:avLst/>
+          </a:prstGeom>
+          <a:noFill/>
+          <a:extLst>
+            <a:ext uri="{909E8E84-426E-40DD-AFC4-6F175D3DCCD1}">
+              <a14:hiddenFill xmlns:a14="http://schemas.microsoft.com/office/drawing/2010/main">
+                <a:solidFill>
+                  <a:srgbClr val="FFFFFF"/>
+                </a:solidFill>
+              </a14:hiddenFill>
+            </a:ext>
+          </a:extLst>
+        </p:spPr>
+      </p:pic>
+    </p:spTree>
+    <p:extLst>
+      <p:ext uri="{BB962C8B-B14F-4D97-AF65-F5344CB8AC3E}">
+        <p14:creationId xmlns:p14="http://schemas.microsoft.com/office/powerpoint/2010/main" val="66605691"/>
+      </p:ext>
+    </p:extLst>
+  </p:cSld>
+  <p:clrMapOvr>
+    <a:masterClrMapping/>
+  </p:clrMapOvr>
+</p:sld>
+</file>
+
+<file path=ppt/slides/slide11.xml><?xml version="1.0" encoding="utf-8"?>
+<p:sld xmlns:a="http://schemas.openxmlformats.org/drawingml/2006/main" xmlns:r="http://schemas.openxmlformats.org/officeDocument/2006/relationships" xmlns:p="http://schemas.openxmlformats.org/presentationml/2006/main">
+  <p:cSld>
+    <p:spTree>
+      <p:nvGrpSpPr>
+        <p:cNvPr id="1" name=""/>
+        <p:cNvGrpSpPr/>
+        <p:nvPr/>
+      </p:nvGrpSpPr>
+      <p:grpSpPr>
+        <a:xfrm>
+          <a:off x="0" y="0"/>
+          <a:ext cx="0" cy="0"/>
+          <a:chOff x="0" y="0"/>
+          <a:chExt cx="0" cy="0"/>
+        </a:xfrm>
+      </p:grpSpPr>
+      <p:sp>
+        <p:nvSpPr>
+          <p:cNvPr id="2" name="Título 1"/>
+          <p:cNvSpPr>
+            <a:spLocks noGrp="1"/>
+          </p:cNvSpPr>
+          <p:nvPr>
+            <p:ph type="title"/>
+          </p:nvPr>
+        </p:nvSpPr>
+        <p:spPr/>
+        <p:txBody>
+          <a:bodyPr/>
+          <a:lstStyle/>
+          <a:p>
+            <a:r>
+              <a:rPr lang="es-ES" dirty="0" smtClean="0"/>
+              <a:t>JSON</a:t>
+            </a:r>
+            <a:endParaRPr lang="es-CO" dirty="0"/>
+          </a:p>
+        </p:txBody>
+      </p:sp>
+      <p:sp>
+        <p:nvSpPr>
+          <p:cNvPr id="3" name="Marcador de contenido 2"/>
+          <p:cNvSpPr>
+            <a:spLocks noGrp="1"/>
+          </p:cNvSpPr>
+          <p:nvPr>
+            <p:ph idx="1"/>
+          </p:nvPr>
+        </p:nvSpPr>
+        <p:spPr>
+          <a:xfrm>
+            <a:off x="1097280" y="3028336"/>
+            <a:ext cx="4782410" cy="2840758"/>
+          </a:xfrm>
+        </p:spPr>
+        <p:txBody>
+          <a:bodyPr/>
+          <a:lstStyle/>
+          <a:p>
+            <a:r>
+              <a:rPr lang="es-ES" dirty="0" smtClean="0"/>
+              <a:t>JSON puede representar un objeto mediante {}</a:t>
+            </a:r>
+          </a:p>
+          <a:p>
+            <a:r>
+              <a:rPr lang="es-ES" dirty="0" smtClean="0"/>
+              <a:t>Dentro de cada llave debe especificar el nombre de los parámetros y los valores</a:t>
+            </a:r>
+          </a:p>
+          <a:p>
+            <a:r>
+              <a:rPr lang="es-ES" dirty="0" smtClean="0"/>
+              <a:t>Los posibles valores son </a:t>
+            </a:r>
+            <a:r>
+              <a:rPr lang="es-ES" dirty="0" err="1" smtClean="0"/>
+              <a:t>Strings</a:t>
+            </a:r>
+            <a:r>
+              <a:rPr lang="es-ES" dirty="0" smtClean="0"/>
+              <a:t>, enteros, decimales y booleanos</a:t>
+            </a:r>
+            <a:endParaRPr lang="es-ES" dirty="0"/>
+          </a:p>
+        </p:txBody>
+      </p:sp>
+      <p:sp>
+        <p:nvSpPr>
+          <p:cNvPr id="5" name="Marcador de contenido 2"/>
+          <p:cNvSpPr txBox="1">
+            <a:spLocks/>
+          </p:cNvSpPr>
+          <p:nvPr/>
+        </p:nvSpPr>
+        <p:spPr>
+          <a:xfrm>
+            <a:off x="6740996" y="2797277"/>
+            <a:ext cx="5451004" cy="2634281"/>
+          </a:xfrm>
+          <a:prstGeom prst="rect">
+            <a:avLst/>
+          </a:prstGeom>
+        </p:spPr>
+        <p:txBody>
+          <a:bodyPr vert="horz" lIns="0" tIns="45720" rIns="0" bIns="45720" rtlCol="0">
+            <a:normAutofit/>
+          </a:bodyPr>
+          <a:lstStyle>
+            <a:lvl1pPr marL="91440" indent="-91440" algn="l" defTabSz="914400" rtl="0" eaLnBrk="1" latinLnBrk="0" hangingPunct="1">
+              <a:lnSpc>
+                <a:spcPct val="90000"/>
+              </a:lnSpc>
+              <a:spcBef>
+                <a:spcPts val="1200"/>
+              </a:spcBef>
+              <a:spcAft>
+                <a:spcPts val="200"/>
+              </a:spcAft>
+              <a:buClr>
+                <a:schemeClr val="accent1"/>
+              </a:buClr>
+              <a:buSzPct val="100000"/>
+              <a:buFont typeface="Calibri" panose="020F0502020204030204" pitchFamily="34" charset="0"/>
+              <a:buChar char=" "/>
+              <a:defRPr sz="2000" kern="1200">
+                <a:solidFill>
+                  <a:schemeClr val="tx1">
+                    <a:lumMod val="75000"/>
+                    <a:lumOff val="25000"/>
+                  </a:schemeClr>
+                </a:solidFill>
+                <a:latin typeface="+mn-lt"/>
+                <a:ea typeface="+mn-ea"/>
+                <a:cs typeface="+mn-cs"/>
+              </a:defRPr>
+            </a:lvl1pPr>
+            <a:lvl2pPr marL="384048" indent="-182880" algn="l" defTabSz="914400" rtl="0" eaLnBrk="1" latinLnBrk="0" hangingPunct="1">
+              <a:lnSpc>
+                <a:spcPct val="90000"/>
+              </a:lnSpc>
+              <a:spcBef>
+                <a:spcPts val="200"/>
+              </a:spcBef>
+              <a:spcAft>
+                <a:spcPts val="400"/>
+              </a:spcAft>
+              <a:buClr>
+                <a:schemeClr val="accent1"/>
+              </a:buClr>
+              <a:buFont typeface="Calibri" pitchFamily="34" charset="0"/>
+              <a:buChar char="◦"/>
+              <a:defRPr sz="1800" kern="1200">
+                <a:solidFill>
+                  <a:schemeClr val="tx1">
+                    <a:lumMod val="75000"/>
+                    <a:lumOff val="25000"/>
+                  </a:schemeClr>
+                </a:solidFill>
+                <a:latin typeface="+mn-lt"/>
+                <a:ea typeface="+mn-ea"/>
+                <a:cs typeface="+mn-cs"/>
+              </a:defRPr>
+            </a:lvl2pPr>
+            <a:lvl3pPr marL="566928" indent="-182880" algn="l" defTabSz="914400" rtl="0" eaLnBrk="1" latinLnBrk="0" hangingPunct="1">
+              <a:lnSpc>
+                <a:spcPct val="90000"/>
+              </a:lnSpc>
+              <a:spcBef>
+                <a:spcPts val="200"/>
+              </a:spcBef>
+              <a:spcAft>
+                <a:spcPts val="400"/>
+              </a:spcAft>
+              <a:buClr>
+                <a:schemeClr val="accent1"/>
+              </a:buClr>
+              <a:buFont typeface="Calibri" pitchFamily="34" charset="0"/>
+              <a:buChar char="◦"/>
+              <a:defRPr sz="1400" kern="1200">
+                <a:solidFill>
+                  <a:schemeClr val="tx1">
+                    <a:lumMod val="75000"/>
+                    <a:lumOff val="25000"/>
+                  </a:schemeClr>
+                </a:solidFill>
+                <a:latin typeface="+mn-lt"/>
+                <a:ea typeface="+mn-ea"/>
+                <a:cs typeface="+mn-cs"/>
+              </a:defRPr>
+            </a:lvl3pPr>
+            <a:lvl4pPr marL="749808" indent="-182880" algn="l" defTabSz="914400" rtl="0" eaLnBrk="1" latinLnBrk="0" hangingPunct="1">
+              <a:lnSpc>
+                <a:spcPct val="90000"/>
+              </a:lnSpc>
+              <a:spcBef>
+                <a:spcPts val="200"/>
+              </a:spcBef>
+              <a:spcAft>
+                <a:spcPts val="400"/>
+              </a:spcAft>
+              <a:buClr>
+                <a:schemeClr val="accent1"/>
+              </a:buClr>
+              <a:buFont typeface="Calibri" pitchFamily="34" charset="0"/>
+              <a:buChar char="◦"/>
+              <a:defRPr sz="1400" kern="1200">
+                <a:solidFill>
+                  <a:schemeClr val="tx1">
+                    <a:lumMod val="75000"/>
+                    <a:lumOff val="25000"/>
+                  </a:schemeClr>
+                </a:solidFill>
+                <a:latin typeface="+mn-lt"/>
+                <a:ea typeface="+mn-ea"/>
+                <a:cs typeface="+mn-cs"/>
+              </a:defRPr>
+            </a:lvl4pPr>
+            <a:lvl5pPr marL="932688" indent="-182880" algn="l" defTabSz="914400" rtl="0" eaLnBrk="1" latinLnBrk="0" hangingPunct="1">
+              <a:lnSpc>
+                <a:spcPct val="90000"/>
+              </a:lnSpc>
+              <a:spcBef>
+                <a:spcPts val="200"/>
+              </a:spcBef>
+              <a:spcAft>
+                <a:spcPts val="400"/>
+              </a:spcAft>
+              <a:buClr>
+                <a:schemeClr val="accent1"/>
+              </a:buClr>
+              <a:buFont typeface="Calibri" pitchFamily="34" charset="0"/>
+              <a:buChar char="◦"/>
+              <a:defRPr sz="1400" kern="1200">
+                <a:solidFill>
+                  <a:schemeClr val="tx1">
+                    <a:lumMod val="75000"/>
+                    <a:lumOff val="25000"/>
+                  </a:schemeClr>
+                </a:solidFill>
+                <a:latin typeface="+mn-lt"/>
+                <a:ea typeface="+mn-ea"/>
+                <a:cs typeface="+mn-cs"/>
+              </a:defRPr>
+            </a:lvl5pPr>
+            <a:lvl6pPr marL="1100000" indent="-228600" algn="l" defTabSz="914400" rtl="0" eaLnBrk="1" latinLnBrk="0" hangingPunct="1">
+              <a:lnSpc>
+                <a:spcPct val="90000"/>
+              </a:lnSpc>
+              <a:spcBef>
+                <a:spcPts val="200"/>
+              </a:spcBef>
+              <a:spcAft>
+                <a:spcPts val="400"/>
+              </a:spcAft>
+              <a:buClr>
+                <a:schemeClr val="accent1"/>
+              </a:buClr>
+              <a:buFont typeface="Calibri" pitchFamily="34" charset="0"/>
+              <a:buChar char="◦"/>
+              <a:defRPr sz="1400" kern="1200">
+                <a:solidFill>
+                  <a:schemeClr val="tx1">
+                    <a:lumMod val="75000"/>
+                    <a:lumOff val="25000"/>
+                  </a:schemeClr>
+                </a:solidFill>
+                <a:latin typeface="+mn-lt"/>
+                <a:ea typeface="+mn-ea"/>
+                <a:cs typeface="+mn-cs"/>
+              </a:defRPr>
+            </a:lvl6pPr>
+            <a:lvl7pPr marL="1300000" indent="-228600" algn="l" defTabSz="914400" rtl="0" eaLnBrk="1" latinLnBrk="0" hangingPunct="1">
+              <a:lnSpc>
+                <a:spcPct val="90000"/>
+              </a:lnSpc>
+              <a:spcBef>
+                <a:spcPts val="200"/>
+              </a:spcBef>
+              <a:spcAft>
+                <a:spcPts val="400"/>
+              </a:spcAft>
+              <a:buClr>
+                <a:schemeClr val="accent1"/>
+              </a:buClr>
+              <a:buFont typeface="Calibri" pitchFamily="34" charset="0"/>
+              <a:buChar char="◦"/>
+              <a:defRPr sz="1400" kern="1200">
+                <a:solidFill>
+                  <a:schemeClr val="tx1">
+                    <a:lumMod val="75000"/>
+                    <a:lumOff val="25000"/>
+                  </a:schemeClr>
+                </a:solidFill>
+                <a:latin typeface="+mn-lt"/>
+                <a:ea typeface="+mn-ea"/>
+                <a:cs typeface="+mn-cs"/>
+              </a:defRPr>
+            </a:lvl7pPr>
+            <a:lvl8pPr marL="1500000" indent="-228600" algn="l" defTabSz="914400" rtl="0" eaLnBrk="1" latinLnBrk="0" hangingPunct="1">
+              <a:lnSpc>
+                <a:spcPct val="90000"/>
+              </a:lnSpc>
+              <a:spcBef>
+                <a:spcPts val="200"/>
+              </a:spcBef>
+              <a:spcAft>
+                <a:spcPts val="400"/>
+              </a:spcAft>
+              <a:buClr>
+                <a:schemeClr val="accent1"/>
+              </a:buClr>
+              <a:buFont typeface="Calibri" pitchFamily="34" charset="0"/>
+              <a:buChar char="◦"/>
+              <a:defRPr sz="1400" kern="1200">
+                <a:solidFill>
+                  <a:schemeClr val="tx1">
+                    <a:lumMod val="75000"/>
+                    <a:lumOff val="25000"/>
+                  </a:schemeClr>
+                </a:solidFill>
+                <a:latin typeface="+mn-lt"/>
+                <a:ea typeface="+mn-ea"/>
+                <a:cs typeface="+mn-cs"/>
+              </a:defRPr>
+            </a:lvl8pPr>
+            <a:lvl9pPr marL="1700000" indent="-228600" algn="l" defTabSz="914400" rtl="0" eaLnBrk="1" latinLnBrk="0" hangingPunct="1">
+              <a:lnSpc>
+                <a:spcPct val="90000"/>
+              </a:lnSpc>
+              <a:spcBef>
+                <a:spcPts val="200"/>
+              </a:spcBef>
+              <a:spcAft>
+                <a:spcPts val="400"/>
+              </a:spcAft>
+              <a:buClr>
+                <a:schemeClr val="accent1"/>
+              </a:buClr>
+              <a:buFont typeface="Calibri" pitchFamily="34" charset="0"/>
+              <a:buChar char="◦"/>
+              <a:defRPr sz="1400" kern="1200">
+                <a:solidFill>
+                  <a:schemeClr val="tx1">
+                    <a:lumMod val="75000"/>
+                    <a:lumOff val="25000"/>
+                  </a:schemeClr>
+                </a:solidFill>
+                <a:latin typeface="+mn-lt"/>
+                <a:ea typeface="+mn-ea"/>
+                <a:cs typeface="+mn-cs"/>
+              </a:defRPr>
+            </a:lvl9pPr>
+          </a:lstStyle>
+          <a:p>
+            <a:r>
+              <a:rPr lang="es-ES" dirty="0" smtClean="0">
+                <a:latin typeface="Consolas" panose="020B0609020204030204" pitchFamily="49" charset="0"/>
+              </a:rPr>
+              <a:t>{</a:t>
+            </a:r>
+          </a:p>
+          <a:p>
+            <a:r>
+              <a:rPr lang="es-ES" dirty="0" smtClean="0">
+                <a:latin typeface="Consolas" panose="020B0609020204030204" pitchFamily="49" charset="0"/>
+              </a:rPr>
+              <a:t>"</a:t>
+            </a:r>
+            <a:r>
+              <a:rPr lang="es-ES" dirty="0" err="1" smtClean="0">
+                <a:latin typeface="Consolas" panose="020B0609020204030204" pitchFamily="49" charset="0"/>
+              </a:rPr>
+              <a:t>nombre":"Andrés</a:t>
+            </a:r>
+            <a:r>
+              <a:rPr lang="es-ES" dirty="0" smtClean="0">
+                <a:latin typeface="Consolas" panose="020B0609020204030204" pitchFamily="49" charset="0"/>
+              </a:rPr>
+              <a:t> Ortega",</a:t>
+            </a:r>
+          </a:p>
+          <a:p>
+            <a:r>
+              <a:rPr lang="es-ES" dirty="0" smtClean="0">
+                <a:latin typeface="Consolas" panose="020B0609020204030204" pitchFamily="49" charset="0"/>
+              </a:rPr>
+              <a:t>"edad":29,</a:t>
+            </a:r>
+            <a:endParaRPr lang="es-ES" dirty="0">
+              <a:latin typeface="Consolas" panose="020B0609020204030204" pitchFamily="49" charset="0"/>
+            </a:endParaRPr>
+          </a:p>
+          <a:p>
+            <a:r>
+              <a:rPr lang="es-ES" dirty="0" smtClean="0">
+                <a:latin typeface="Consolas" panose="020B0609020204030204" pitchFamily="49" charset="0"/>
+              </a:rPr>
+              <a:t>"altura":1.70,</a:t>
+            </a:r>
+          </a:p>
+          <a:p>
+            <a:r>
+              <a:rPr lang="es-ES" dirty="0" smtClean="0">
+                <a:latin typeface="Consolas" panose="020B0609020204030204" pitchFamily="49" charset="0"/>
+              </a:rPr>
+              <a:t>"</a:t>
+            </a:r>
+            <a:r>
+              <a:rPr lang="es-ES" dirty="0" err="1" smtClean="0">
+                <a:latin typeface="Consolas" panose="020B0609020204030204" pitchFamily="49" charset="0"/>
+              </a:rPr>
+              <a:t>isFat</a:t>
+            </a:r>
+            <a:r>
+              <a:rPr lang="es-ES" dirty="0" smtClean="0">
+                <a:latin typeface="Consolas" panose="020B0609020204030204" pitchFamily="49" charset="0"/>
+              </a:rPr>
+              <a:t>":true,</a:t>
+            </a:r>
+          </a:p>
+          <a:p>
+            <a:r>
+              <a:rPr lang="es-ES" dirty="0" smtClean="0">
+                <a:latin typeface="Consolas" panose="020B0609020204030204" pitchFamily="49" charset="0"/>
+              </a:rPr>
+              <a:t>}</a:t>
+            </a:r>
+            <a:endParaRPr lang="es-ES" dirty="0">
+              <a:latin typeface="Consolas" panose="020B0609020204030204" pitchFamily="49" charset="0"/>
+            </a:endParaRPr>
+          </a:p>
+        </p:txBody>
+      </p:sp>
+    </p:spTree>
+    <p:extLst>
+      <p:ext uri="{BB962C8B-B14F-4D97-AF65-F5344CB8AC3E}">
+        <p14:creationId xmlns:p14="http://schemas.microsoft.com/office/powerpoint/2010/main" val="387582256"/>
+      </p:ext>
+    </p:extLst>
+  </p:cSld>
+  <p:clrMapOvr>
+    <a:masterClrMapping/>
+  </p:clrMapOvr>
+</p:sld>
+</file>
+
+<file path=ppt/slides/slide12.xml><?xml version="1.0" encoding="utf-8"?>
+<p:sld xmlns:a="http://schemas.openxmlformats.org/drawingml/2006/main" xmlns:r="http://schemas.openxmlformats.org/officeDocument/2006/relationships" xmlns:p="http://schemas.openxmlformats.org/presentationml/2006/main">
+  <p:cSld>
+    <p:spTree>
+      <p:nvGrpSpPr>
+        <p:cNvPr id="1" name=""/>
+        <p:cNvGrpSpPr/>
+        <p:nvPr/>
+      </p:nvGrpSpPr>
+      <p:grpSpPr>
+        <a:xfrm>
+          <a:off x="0" y="0"/>
+          <a:ext cx="0" cy="0"/>
+          <a:chOff x="0" y="0"/>
+          <a:chExt cx="0" cy="0"/>
+        </a:xfrm>
+      </p:grpSpPr>
+      <p:sp>
+        <p:nvSpPr>
+          <p:cNvPr id="2" name="Título 1"/>
+          <p:cNvSpPr>
+            <a:spLocks noGrp="1"/>
+          </p:cNvSpPr>
+          <p:nvPr>
+            <p:ph type="title"/>
+          </p:nvPr>
+        </p:nvSpPr>
+        <p:spPr/>
+        <p:txBody>
+          <a:bodyPr/>
+          <a:lstStyle/>
+          <a:p>
+            <a:r>
+              <a:rPr lang="es-ES" dirty="0" smtClean="0"/>
+              <a:t>JSON</a:t>
+            </a:r>
+            <a:endParaRPr lang="es-CO" dirty="0"/>
+          </a:p>
+        </p:txBody>
+      </p:sp>
+      <p:sp>
+        <p:nvSpPr>
+          <p:cNvPr id="3" name="Marcador de contenido 2"/>
+          <p:cNvSpPr>
+            <a:spLocks noGrp="1"/>
+          </p:cNvSpPr>
+          <p:nvPr>
+            <p:ph idx="1"/>
+          </p:nvPr>
+        </p:nvSpPr>
+        <p:spPr>
+          <a:xfrm>
+            <a:off x="1097280" y="3028336"/>
+            <a:ext cx="4782410" cy="2840758"/>
+          </a:xfrm>
+        </p:spPr>
+        <p:txBody>
+          <a:bodyPr/>
+          <a:lstStyle/>
+          <a:p>
+            <a:r>
+              <a:rPr lang="es-ES" dirty="0" smtClean="0"/>
+              <a:t>JSON puede representar una lista mediante []</a:t>
+            </a:r>
+          </a:p>
+          <a:p>
+            <a:r>
+              <a:rPr lang="es-ES" dirty="0" smtClean="0"/>
+              <a:t>Dentro de los corchetes debe especificar la lista de valores sin un </a:t>
+            </a:r>
+            <a:r>
+              <a:rPr lang="es-ES" b="1" dirty="0" smtClean="0"/>
+              <a:t>clave</a:t>
+            </a:r>
+            <a:endParaRPr lang="es-ES" b="1" dirty="0"/>
+          </a:p>
+        </p:txBody>
+      </p:sp>
+      <p:sp>
+        <p:nvSpPr>
+          <p:cNvPr id="5" name="Marcador de contenido 2"/>
+          <p:cNvSpPr txBox="1">
+            <a:spLocks/>
+          </p:cNvSpPr>
+          <p:nvPr/>
+        </p:nvSpPr>
+        <p:spPr>
+          <a:xfrm>
+            <a:off x="6740996" y="2797277"/>
+            <a:ext cx="5451004" cy="2634281"/>
+          </a:xfrm>
+          <a:prstGeom prst="rect">
+            <a:avLst/>
+          </a:prstGeom>
+        </p:spPr>
+        <p:txBody>
+          <a:bodyPr vert="horz" lIns="0" tIns="45720" rIns="0" bIns="45720" rtlCol="0">
+            <a:normAutofit/>
+          </a:bodyPr>
+          <a:lstStyle>
+            <a:lvl1pPr marL="91440" indent="-91440" algn="l" defTabSz="914400" rtl="0" eaLnBrk="1" latinLnBrk="0" hangingPunct="1">
+              <a:lnSpc>
+                <a:spcPct val="90000"/>
+              </a:lnSpc>
+              <a:spcBef>
+                <a:spcPts val="1200"/>
+              </a:spcBef>
+              <a:spcAft>
+                <a:spcPts val="200"/>
+              </a:spcAft>
+              <a:buClr>
+                <a:schemeClr val="accent1"/>
+              </a:buClr>
+              <a:buSzPct val="100000"/>
+              <a:buFont typeface="Calibri" panose="020F0502020204030204" pitchFamily="34" charset="0"/>
+              <a:buChar char=" "/>
+              <a:defRPr sz="2000" kern="1200">
+                <a:solidFill>
+                  <a:schemeClr val="tx1">
+                    <a:lumMod val="75000"/>
+                    <a:lumOff val="25000"/>
+                  </a:schemeClr>
+                </a:solidFill>
+                <a:latin typeface="+mn-lt"/>
+                <a:ea typeface="+mn-ea"/>
+                <a:cs typeface="+mn-cs"/>
+              </a:defRPr>
+            </a:lvl1pPr>
+            <a:lvl2pPr marL="384048" indent="-182880" algn="l" defTabSz="914400" rtl="0" eaLnBrk="1" latinLnBrk="0" hangingPunct="1">
+              <a:lnSpc>
+                <a:spcPct val="90000"/>
+              </a:lnSpc>
+              <a:spcBef>
+                <a:spcPts val="200"/>
+              </a:spcBef>
+              <a:spcAft>
+                <a:spcPts val="400"/>
+              </a:spcAft>
+              <a:buClr>
+                <a:schemeClr val="accent1"/>
+              </a:buClr>
+              <a:buFont typeface="Calibri" pitchFamily="34" charset="0"/>
+              <a:buChar char="◦"/>
+              <a:defRPr sz="1800" kern="1200">
+                <a:solidFill>
+                  <a:schemeClr val="tx1">
+                    <a:lumMod val="75000"/>
+                    <a:lumOff val="25000"/>
+                  </a:schemeClr>
+                </a:solidFill>
+                <a:latin typeface="+mn-lt"/>
+                <a:ea typeface="+mn-ea"/>
+                <a:cs typeface="+mn-cs"/>
+              </a:defRPr>
+            </a:lvl2pPr>
+            <a:lvl3pPr marL="566928" indent="-182880" algn="l" defTabSz="914400" rtl="0" eaLnBrk="1" latinLnBrk="0" hangingPunct="1">
+              <a:lnSpc>
+                <a:spcPct val="90000"/>
+              </a:lnSpc>
+              <a:spcBef>
+                <a:spcPts val="200"/>
+              </a:spcBef>
+              <a:spcAft>
+                <a:spcPts val="400"/>
+              </a:spcAft>
+              <a:buClr>
+                <a:schemeClr val="accent1"/>
+              </a:buClr>
+              <a:buFont typeface="Calibri" pitchFamily="34" charset="0"/>
+              <a:buChar char="◦"/>
+              <a:defRPr sz="1400" kern="1200">
+                <a:solidFill>
+                  <a:schemeClr val="tx1">
+                    <a:lumMod val="75000"/>
+                    <a:lumOff val="25000"/>
+                  </a:schemeClr>
+                </a:solidFill>
+                <a:latin typeface="+mn-lt"/>
+                <a:ea typeface="+mn-ea"/>
+                <a:cs typeface="+mn-cs"/>
+              </a:defRPr>
+            </a:lvl3pPr>
+            <a:lvl4pPr marL="749808" indent="-182880" algn="l" defTabSz="914400" rtl="0" eaLnBrk="1" latinLnBrk="0" hangingPunct="1">
+              <a:lnSpc>
+                <a:spcPct val="90000"/>
+              </a:lnSpc>
+              <a:spcBef>
+                <a:spcPts val="200"/>
+              </a:spcBef>
+              <a:spcAft>
+                <a:spcPts val="400"/>
+              </a:spcAft>
+              <a:buClr>
+                <a:schemeClr val="accent1"/>
+              </a:buClr>
+              <a:buFont typeface="Calibri" pitchFamily="34" charset="0"/>
+              <a:buChar char="◦"/>
+              <a:defRPr sz="1400" kern="1200">
+                <a:solidFill>
+                  <a:schemeClr val="tx1">
+                    <a:lumMod val="75000"/>
+                    <a:lumOff val="25000"/>
+                  </a:schemeClr>
+                </a:solidFill>
+                <a:latin typeface="+mn-lt"/>
+                <a:ea typeface="+mn-ea"/>
+                <a:cs typeface="+mn-cs"/>
+              </a:defRPr>
+            </a:lvl4pPr>
+            <a:lvl5pPr marL="932688" indent="-182880" algn="l" defTabSz="914400" rtl="0" eaLnBrk="1" latinLnBrk="0" hangingPunct="1">
+              <a:lnSpc>
+                <a:spcPct val="90000"/>
+              </a:lnSpc>
+              <a:spcBef>
+                <a:spcPts val="200"/>
+              </a:spcBef>
+              <a:spcAft>
+                <a:spcPts val="400"/>
+              </a:spcAft>
+              <a:buClr>
+                <a:schemeClr val="accent1"/>
+              </a:buClr>
+              <a:buFont typeface="Calibri" pitchFamily="34" charset="0"/>
+              <a:buChar char="◦"/>
+              <a:defRPr sz="1400" kern="1200">
+                <a:solidFill>
+                  <a:schemeClr val="tx1">
+                    <a:lumMod val="75000"/>
+                    <a:lumOff val="25000"/>
+                  </a:schemeClr>
+                </a:solidFill>
+                <a:latin typeface="+mn-lt"/>
+                <a:ea typeface="+mn-ea"/>
+                <a:cs typeface="+mn-cs"/>
+              </a:defRPr>
+            </a:lvl5pPr>
+            <a:lvl6pPr marL="1100000" indent="-228600" algn="l" defTabSz="914400" rtl="0" eaLnBrk="1" latinLnBrk="0" hangingPunct="1">
+              <a:lnSpc>
+                <a:spcPct val="90000"/>
+              </a:lnSpc>
+              <a:spcBef>
+                <a:spcPts val="200"/>
+              </a:spcBef>
+              <a:spcAft>
+                <a:spcPts val="400"/>
+              </a:spcAft>
+              <a:buClr>
+                <a:schemeClr val="accent1"/>
+              </a:buClr>
+              <a:buFont typeface="Calibri" pitchFamily="34" charset="0"/>
+              <a:buChar char="◦"/>
+              <a:defRPr sz="1400" kern="1200">
+                <a:solidFill>
+                  <a:schemeClr val="tx1">
+                    <a:lumMod val="75000"/>
+                    <a:lumOff val="25000"/>
+                  </a:schemeClr>
+                </a:solidFill>
+                <a:latin typeface="+mn-lt"/>
+                <a:ea typeface="+mn-ea"/>
+                <a:cs typeface="+mn-cs"/>
+              </a:defRPr>
+            </a:lvl6pPr>
+            <a:lvl7pPr marL="1300000" indent="-228600" algn="l" defTabSz="914400" rtl="0" eaLnBrk="1" latinLnBrk="0" hangingPunct="1">
+              <a:lnSpc>
+                <a:spcPct val="90000"/>
+              </a:lnSpc>
+              <a:spcBef>
+                <a:spcPts val="200"/>
+              </a:spcBef>
+              <a:spcAft>
+                <a:spcPts val="400"/>
+              </a:spcAft>
+              <a:buClr>
+                <a:schemeClr val="accent1"/>
+              </a:buClr>
+              <a:buFont typeface="Calibri" pitchFamily="34" charset="0"/>
+              <a:buChar char="◦"/>
+              <a:defRPr sz="1400" kern="1200">
+                <a:solidFill>
+                  <a:schemeClr val="tx1">
+                    <a:lumMod val="75000"/>
+                    <a:lumOff val="25000"/>
+                  </a:schemeClr>
+                </a:solidFill>
+                <a:latin typeface="+mn-lt"/>
+                <a:ea typeface="+mn-ea"/>
+                <a:cs typeface="+mn-cs"/>
+              </a:defRPr>
+            </a:lvl7pPr>
+            <a:lvl8pPr marL="1500000" indent="-228600" algn="l" defTabSz="914400" rtl="0" eaLnBrk="1" latinLnBrk="0" hangingPunct="1">
+              <a:lnSpc>
+                <a:spcPct val="90000"/>
+              </a:lnSpc>
+              <a:spcBef>
+                <a:spcPts val="200"/>
+              </a:spcBef>
+              <a:spcAft>
+                <a:spcPts val="400"/>
+              </a:spcAft>
+              <a:buClr>
+                <a:schemeClr val="accent1"/>
+              </a:buClr>
+              <a:buFont typeface="Calibri" pitchFamily="34" charset="0"/>
+              <a:buChar char="◦"/>
+              <a:defRPr sz="1400" kern="1200">
+                <a:solidFill>
+                  <a:schemeClr val="tx1">
+                    <a:lumMod val="75000"/>
+                    <a:lumOff val="25000"/>
+                  </a:schemeClr>
+                </a:solidFill>
+                <a:latin typeface="+mn-lt"/>
+                <a:ea typeface="+mn-ea"/>
+                <a:cs typeface="+mn-cs"/>
+              </a:defRPr>
+            </a:lvl8pPr>
+            <a:lvl9pPr marL="1700000" indent="-228600" algn="l" defTabSz="914400" rtl="0" eaLnBrk="1" latinLnBrk="0" hangingPunct="1">
+              <a:lnSpc>
+                <a:spcPct val="90000"/>
+              </a:lnSpc>
+              <a:spcBef>
+                <a:spcPts val="200"/>
+              </a:spcBef>
+              <a:spcAft>
+                <a:spcPts val="400"/>
+              </a:spcAft>
+              <a:buClr>
+                <a:schemeClr val="accent1"/>
+              </a:buClr>
+              <a:buFont typeface="Calibri" pitchFamily="34" charset="0"/>
+              <a:buChar char="◦"/>
+              <a:defRPr sz="1400" kern="1200">
+                <a:solidFill>
+                  <a:schemeClr val="tx1">
+                    <a:lumMod val="75000"/>
+                    <a:lumOff val="25000"/>
+                  </a:schemeClr>
+                </a:solidFill>
+                <a:latin typeface="+mn-lt"/>
+                <a:ea typeface="+mn-ea"/>
+                <a:cs typeface="+mn-cs"/>
+              </a:defRPr>
+            </a:lvl9pPr>
+          </a:lstStyle>
+          <a:p>
+            <a:r>
+              <a:rPr lang="es-ES" dirty="0">
+                <a:latin typeface="Consolas" panose="020B0609020204030204" pitchFamily="49" charset="0"/>
+              </a:rPr>
+              <a:t>[</a:t>
+            </a:r>
+            <a:endParaRPr lang="es-ES" dirty="0" smtClean="0">
+              <a:latin typeface="Consolas" panose="020B0609020204030204" pitchFamily="49" charset="0"/>
+            </a:endParaRPr>
+          </a:p>
+          <a:p>
+            <a:r>
+              <a:rPr lang="es-ES" dirty="0" smtClean="0">
+                <a:latin typeface="Consolas" panose="020B0609020204030204" pitchFamily="49" charset="0"/>
+              </a:rPr>
+              <a:t>"Christian",</a:t>
+            </a:r>
+          </a:p>
+          <a:p>
+            <a:r>
+              <a:rPr lang="es-ES" dirty="0" smtClean="0">
+                <a:latin typeface="Consolas" panose="020B0609020204030204" pitchFamily="49" charset="0"/>
+              </a:rPr>
+              <a:t>"Jefferson",</a:t>
+            </a:r>
+            <a:endParaRPr lang="es-ES" dirty="0">
+              <a:latin typeface="Consolas" panose="020B0609020204030204" pitchFamily="49" charset="0"/>
+            </a:endParaRPr>
+          </a:p>
+          <a:p>
+            <a:r>
+              <a:rPr lang="es-ES" dirty="0" smtClean="0">
+                <a:latin typeface="Consolas" panose="020B0609020204030204" pitchFamily="49" charset="0"/>
+              </a:rPr>
+              <a:t>"Daniel",</a:t>
+            </a:r>
+            <a:endParaRPr lang="es-ES" dirty="0">
+              <a:latin typeface="Consolas" panose="020B0609020204030204" pitchFamily="49" charset="0"/>
+            </a:endParaRPr>
+          </a:p>
+          <a:p>
+            <a:r>
+              <a:rPr lang="es-ES" dirty="0" smtClean="0">
+                <a:latin typeface="Consolas" panose="020B0609020204030204" pitchFamily="49" charset="0"/>
+              </a:rPr>
+              <a:t>"Nicolás"</a:t>
+            </a:r>
+            <a:endParaRPr lang="es-ES" dirty="0">
+              <a:latin typeface="Consolas" panose="020B0609020204030204" pitchFamily="49" charset="0"/>
+            </a:endParaRPr>
+          </a:p>
+          <a:p>
+            <a:r>
+              <a:rPr lang="es-ES" dirty="0">
+                <a:latin typeface="Consolas" panose="020B0609020204030204" pitchFamily="49" charset="0"/>
+              </a:rPr>
+              <a:t>]</a:t>
+            </a:r>
+            <a:endParaRPr lang="es-ES" dirty="0">
+              <a:latin typeface="Consolas" panose="020B0609020204030204" pitchFamily="49" charset="0"/>
+            </a:endParaRPr>
+          </a:p>
+        </p:txBody>
+      </p:sp>
+    </p:spTree>
+    <p:extLst>
+      <p:ext uri="{BB962C8B-B14F-4D97-AF65-F5344CB8AC3E}">
+        <p14:creationId xmlns:p14="http://schemas.microsoft.com/office/powerpoint/2010/main" val="2019403361"/>
+      </p:ext>
+    </p:extLst>
+  </p:cSld>
+  <p:clrMapOvr>
+    <a:masterClrMapping/>
+  </p:clrMapOvr>
+</p:sld>
+</file>
+
+<file path=ppt/slides/slide13.xml><?xml version="1.0" encoding="utf-8"?>
+<p:sld xmlns:a="http://schemas.openxmlformats.org/drawingml/2006/main" xmlns:r="http://schemas.openxmlformats.org/officeDocument/2006/relationships" xmlns:p="http://schemas.openxmlformats.org/presentationml/2006/main">
+  <p:cSld>
+    <p:spTree>
+      <p:nvGrpSpPr>
+        <p:cNvPr id="1" name=""/>
+        <p:cNvGrpSpPr/>
+        <p:nvPr/>
+      </p:nvGrpSpPr>
+      <p:grpSpPr>
+        <a:xfrm>
+          <a:off x="0" y="0"/>
+          <a:ext cx="0" cy="0"/>
+          <a:chOff x="0" y="0"/>
+          <a:chExt cx="0" cy="0"/>
+        </a:xfrm>
+      </p:grpSpPr>
+      <p:sp>
+        <p:nvSpPr>
+          <p:cNvPr id="2" name="Título 1"/>
+          <p:cNvSpPr>
+            <a:spLocks noGrp="1"/>
+          </p:cNvSpPr>
+          <p:nvPr>
+            <p:ph type="title"/>
+          </p:nvPr>
+        </p:nvSpPr>
+        <p:spPr/>
+        <p:txBody>
+          <a:bodyPr/>
+          <a:lstStyle/>
+          <a:p>
+            <a:r>
+              <a:rPr lang="es-ES" dirty="0" smtClean="0"/>
+              <a:t>JSON</a:t>
+            </a:r>
+            <a:endParaRPr lang="es-CO" dirty="0"/>
+          </a:p>
+        </p:txBody>
+      </p:sp>
+      <p:sp>
+        <p:nvSpPr>
+          <p:cNvPr id="3" name="Marcador de contenido 2"/>
+          <p:cNvSpPr>
+            <a:spLocks noGrp="1"/>
+          </p:cNvSpPr>
+          <p:nvPr>
+            <p:ph idx="1"/>
+          </p:nvPr>
+        </p:nvSpPr>
+        <p:spPr>
+          <a:xfrm>
+            <a:off x="1097280" y="3028336"/>
+            <a:ext cx="4782410" cy="2840758"/>
+          </a:xfrm>
+        </p:spPr>
+        <p:txBody>
+          <a:bodyPr/>
+          <a:lstStyle/>
+          <a:p>
+            <a:pPr marL="0" indent="0">
+              <a:buNone/>
+            </a:pPr>
+            <a:r>
+              <a:rPr lang="es-ES" dirty="0" smtClean="0"/>
+              <a:t>Un objeto puede ser valor de una clave</a:t>
+            </a:r>
+            <a:endParaRPr lang="es-ES" b="1" dirty="0"/>
+          </a:p>
+        </p:txBody>
+      </p:sp>
+      <p:sp>
+        <p:nvSpPr>
+          <p:cNvPr id="7" name="Marcador de contenido 2"/>
+          <p:cNvSpPr txBox="1">
+            <a:spLocks/>
+          </p:cNvSpPr>
+          <p:nvPr/>
+        </p:nvSpPr>
+        <p:spPr>
+          <a:xfrm>
+            <a:off x="6740996" y="2212259"/>
+            <a:ext cx="5451004" cy="3765754"/>
+          </a:xfrm>
+          <a:prstGeom prst="rect">
+            <a:avLst/>
+          </a:prstGeom>
+        </p:spPr>
+        <p:txBody>
+          <a:bodyPr vert="horz" lIns="0" tIns="45720" rIns="0" bIns="45720" rtlCol="0">
+            <a:normAutofit/>
+          </a:bodyPr>
+          <a:lstStyle>
+            <a:lvl1pPr marL="91440" indent="-91440" algn="l" defTabSz="914400" rtl="0" eaLnBrk="1" latinLnBrk="0" hangingPunct="1">
+              <a:lnSpc>
+                <a:spcPct val="90000"/>
+              </a:lnSpc>
+              <a:spcBef>
+                <a:spcPts val="1200"/>
+              </a:spcBef>
+              <a:spcAft>
+                <a:spcPts val="200"/>
+              </a:spcAft>
+              <a:buClr>
+                <a:schemeClr val="accent1"/>
+              </a:buClr>
+              <a:buSzPct val="100000"/>
+              <a:buFont typeface="Calibri" panose="020F0502020204030204" pitchFamily="34" charset="0"/>
+              <a:buChar char=" "/>
+              <a:defRPr sz="2000" kern="1200">
+                <a:solidFill>
+                  <a:schemeClr val="tx1">
+                    <a:lumMod val="75000"/>
+                    <a:lumOff val="25000"/>
+                  </a:schemeClr>
+                </a:solidFill>
+                <a:latin typeface="+mn-lt"/>
+                <a:ea typeface="+mn-ea"/>
+                <a:cs typeface="+mn-cs"/>
+              </a:defRPr>
+            </a:lvl1pPr>
+            <a:lvl2pPr marL="384048" indent="-182880" algn="l" defTabSz="914400" rtl="0" eaLnBrk="1" latinLnBrk="0" hangingPunct="1">
+              <a:lnSpc>
+                <a:spcPct val="90000"/>
+              </a:lnSpc>
+              <a:spcBef>
+                <a:spcPts val="200"/>
+              </a:spcBef>
+              <a:spcAft>
+                <a:spcPts val="400"/>
+              </a:spcAft>
+              <a:buClr>
+                <a:schemeClr val="accent1"/>
+              </a:buClr>
+              <a:buFont typeface="Calibri" pitchFamily="34" charset="0"/>
+              <a:buChar char="◦"/>
+              <a:defRPr sz="1800" kern="1200">
+                <a:solidFill>
+                  <a:schemeClr val="tx1">
+                    <a:lumMod val="75000"/>
+                    <a:lumOff val="25000"/>
+                  </a:schemeClr>
+                </a:solidFill>
+                <a:latin typeface="+mn-lt"/>
+                <a:ea typeface="+mn-ea"/>
+                <a:cs typeface="+mn-cs"/>
+              </a:defRPr>
+            </a:lvl2pPr>
+            <a:lvl3pPr marL="566928" indent="-182880" algn="l" defTabSz="914400" rtl="0" eaLnBrk="1" latinLnBrk="0" hangingPunct="1">
+              <a:lnSpc>
+                <a:spcPct val="90000"/>
+              </a:lnSpc>
+              <a:spcBef>
+                <a:spcPts val="200"/>
+              </a:spcBef>
+              <a:spcAft>
+                <a:spcPts val="400"/>
+              </a:spcAft>
+              <a:buClr>
+                <a:schemeClr val="accent1"/>
+              </a:buClr>
+              <a:buFont typeface="Calibri" pitchFamily="34" charset="0"/>
+              <a:buChar char="◦"/>
+              <a:defRPr sz="1400" kern="1200">
+                <a:solidFill>
+                  <a:schemeClr val="tx1">
+                    <a:lumMod val="75000"/>
+                    <a:lumOff val="25000"/>
+                  </a:schemeClr>
+                </a:solidFill>
+                <a:latin typeface="+mn-lt"/>
+                <a:ea typeface="+mn-ea"/>
+                <a:cs typeface="+mn-cs"/>
+              </a:defRPr>
+            </a:lvl3pPr>
+            <a:lvl4pPr marL="749808" indent="-182880" algn="l" defTabSz="914400" rtl="0" eaLnBrk="1" latinLnBrk="0" hangingPunct="1">
+              <a:lnSpc>
+                <a:spcPct val="90000"/>
+              </a:lnSpc>
+              <a:spcBef>
+                <a:spcPts val="200"/>
+              </a:spcBef>
+              <a:spcAft>
+                <a:spcPts val="400"/>
+              </a:spcAft>
+              <a:buClr>
+                <a:schemeClr val="accent1"/>
+              </a:buClr>
+              <a:buFont typeface="Calibri" pitchFamily="34" charset="0"/>
+              <a:buChar char="◦"/>
+              <a:defRPr sz="1400" kern="1200">
+                <a:solidFill>
+                  <a:schemeClr val="tx1">
+                    <a:lumMod val="75000"/>
+                    <a:lumOff val="25000"/>
+                  </a:schemeClr>
+                </a:solidFill>
+                <a:latin typeface="+mn-lt"/>
+                <a:ea typeface="+mn-ea"/>
+                <a:cs typeface="+mn-cs"/>
+              </a:defRPr>
+            </a:lvl4pPr>
+            <a:lvl5pPr marL="932688" indent="-182880" algn="l" defTabSz="914400" rtl="0" eaLnBrk="1" latinLnBrk="0" hangingPunct="1">
+              <a:lnSpc>
+                <a:spcPct val="90000"/>
+              </a:lnSpc>
+              <a:spcBef>
+                <a:spcPts val="200"/>
+              </a:spcBef>
+              <a:spcAft>
+                <a:spcPts val="400"/>
+              </a:spcAft>
+              <a:buClr>
+                <a:schemeClr val="accent1"/>
+              </a:buClr>
+              <a:buFont typeface="Calibri" pitchFamily="34" charset="0"/>
+              <a:buChar char="◦"/>
+              <a:defRPr sz="1400" kern="1200">
+                <a:solidFill>
+                  <a:schemeClr val="tx1">
+                    <a:lumMod val="75000"/>
+                    <a:lumOff val="25000"/>
+                  </a:schemeClr>
+                </a:solidFill>
+                <a:latin typeface="+mn-lt"/>
+                <a:ea typeface="+mn-ea"/>
+                <a:cs typeface="+mn-cs"/>
+              </a:defRPr>
+            </a:lvl5pPr>
+            <a:lvl6pPr marL="1100000" indent="-228600" algn="l" defTabSz="914400" rtl="0" eaLnBrk="1" latinLnBrk="0" hangingPunct="1">
+              <a:lnSpc>
+                <a:spcPct val="90000"/>
+              </a:lnSpc>
+              <a:spcBef>
+                <a:spcPts val="200"/>
+              </a:spcBef>
+              <a:spcAft>
+                <a:spcPts val="400"/>
+              </a:spcAft>
+              <a:buClr>
+                <a:schemeClr val="accent1"/>
+              </a:buClr>
+              <a:buFont typeface="Calibri" pitchFamily="34" charset="0"/>
+              <a:buChar char="◦"/>
+              <a:defRPr sz="1400" kern="1200">
+                <a:solidFill>
+                  <a:schemeClr val="tx1">
+                    <a:lumMod val="75000"/>
+                    <a:lumOff val="25000"/>
+                  </a:schemeClr>
+                </a:solidFill>
+                <a:latin typeface="+mn-lt"/>
+                <a:ea typeface="+mn-ea"/>
+                <a:cs typeface="+mn-cs"/>
+              </a:defRPr>
+            </a:lvl6pPr>
+            <a:lvl7pPr marL="1300000" indent="-228600" algn="l" defTabSz="914400" rtl="0" eaLnBrk="1" latinLnBrk="0" hangingPunct="1">
+              <a:lnSpc>
+                <a:spcPct val="90000"/>
+              </a:lnSpc>
+              <a:spcBef>
+                <a:spcPts val="200"/>
+              </a:spcBef>
+              <a:spcAft>
+                <a:spcPts val="400"/>
+              </a:spcAft>
+              <a:buClr>
+                <a:schemeClr val="accent1"/>
+              </a:buClr>
+              <a:buFont typeface="Calibri" pitchFamily="34" charset="0"/>
+              <a:buChar char="◦"/>
+              <a:defRPr sz="1400" kern="1200">
+                <a:solidFill>
+                  <a:schemeClr val="tx1">
+                    <a:lumMod val="75000"/>
+                    <a:lumOff val="25000"/>
+                  </a:schemeClr>
+                </a:solidFill>
+                <a:latin typeface="+mn-lt"/>
+                <a:ea typeface="+mn-ea"/>
+                <a:cs typeface="+mn-cs"/>
+              </a:defRPr>
+            </a:lvl7pPr>
+            <a:lvl8pPr marL="1500000" indent="-228600" algn="l" defTabSz="914400" rtl="0" eaLnBrk="1" latinLnBrk="0" hangingPunct="1">
+              <a:lnSpc>
+                <a:spcPct val="90000"/>
+              </a:lnSpc>
+              <a:spcBef>
+                <a:spcPts val="200"/>
+              </a:spcBef>
+              <a:spcAft>
+                <a:spcPts val="400"/>
+              </a:spcAft>
+              <a:buClr>
+                <a:schemeClr val="accent1"/>
+              </a:buClr>
+              <a:buFont typeface="Calibri" pitchFamily="34" charset="0"/>
+              <a:buChar char="◦"/>
+              <a:defRPr sz="1400" kern="1200">
+                <a:solidFill>
+                  <a:schemeClr val="tx1">
+                    <a:lumMod val="75000"/>
+                    <a:lumOff val="25000"/>
+                  </a:schemeClr>
+                </a:solidFill>
+                <a:latin typeface="+mn-lt"/>
+                <a:ea typeface="+mn-ea"/>
+                <a:cs typeface="+mn-cs"/>
+              </a:defRPr>
+            </a:lvl8pPr>
+            <a:lvl9pPr marL="1700000" indent="-228600" algn="l" defTabSz="914400" rtl="0" eaLnBrk="1" latinLnBrk="0" hangingPunct="1">
+              <a:lnSpc>
+                <a:spcPct val="90000"/>
+              </a:lnSpc>
+              <a:spcBef>
+                <a:spcPts val="200"/>
+              </a:spcBef>
+              <a:spcAft>
+                <a:spcPts val="400"/>
+              </a:spcAft>
+              <a:buClr>
+                <a:schemeClr val="accent1"/>
+              </a:buClr>
+              <a:buFont typeface="Calibri" pitchFamily="34" charset="0"/>
+              <a:buChar char="◦"/>
+              <a:defRPr sz="1400" kern="1200">
+                <a:solidFill>
+                  <a:schemeClr val="tx1">
+                    <a:lumMod val="75000"/>
+                    <a:lumOff val="25000"/>
+                  </a:schemeClr>
+                </a:solidFill>
+                <a:latin typeface="+mn-lt"/>
+                <a:ea typeface="+mn-ea"/>
+                <a:cs typeface="+mn-cs"/>
+              </a:defRPr>
+            </a:lvl9pPr>
+          </a:lstStyle>
+          <a:p>
+            <a:r>
+              <a:rPr lang="es-ES" dirty="0" smtClean="0">
+                <a:latin typeface="Consolas" panose="020B0609020204030204" pitchFamily="49" charset="0"/>
+              </a:rPr>
+              <a:t>{</a:t>
+            </a:r>
+          </a:p>
+          <a:p>
+            <a:r>
+              <a:rPr lang="es-ES" dirty="0" smtClean="0">
+                <a:latin typeface="Consolas" panose="020B0609020204030204" pitchFamily="49" charset="0"/>
+              </a:rPr>
+              <a:t>"manager":{</a:t>
+            </a:r>
+          </a:p>
+          <a:p>
+            <a:r>
+              <a:rPr lang="es-ES" dirty="0" smtClean="0">
+                <a:latin typeface="Consolas" panose="020B0609020204030204" pitchFamily="49" charset="0"/>
+              </a:rPr>
+              <a:t>"</a:t>
+            </a:r>
+            <a:r>
+              <a:rPr lang="es-ES" dirty="0" err="1" smtClean="0">
+                <a:latin typeface="Consolas" panose="020B0609020204030204" pitchFamily="49" charset="0"/>
+              </a:rPr>
+              <a:t>nombre":"Andrés</a:t>
+            </a:r>
+            <a:r>
+              <a:rPr lang="es-ES" dirty="0" smtClean="0">
+                <a:latin typeface="Consolas" panose="020B0609020204030204" pitchFamily="49" charset="0"/>
+              </a:rPr>
+              <a:t> Ortega",</a:t>
+            </a:r>
+          </a:p>
+          <a:p>
+            <a:r>
+              <a:rPr lang="es-ES" dirty="0" smtClean="0">
+                <a:latin typeface="Consolas" panose="020B0609020204030204" pitchFamily="49" charset="0"/>
+              </a:rPr>
+              <a:t>"edad":29,</a:t>
+            </a:r>
+            <a:endParaRPr lang="es-ES" dirty="0">
+              <a:latin typeface="Consolas" panose="020B0609020204030204" pitchFamily="49" charset="0"/>
+            </a:endParaRPr>
+          </a:p>
+          <a:p>
+            <a:r>
+              <a:rPr lang="es-ES" dirty="0" smtClean="0">
+                <a:latin typeface="Consolas" panose="020B0609020204030204" pitchFamily="49" charset="0"/>
+              </a:rPr>
+              <a:t>"altura":1.70,</a:t>
+            </a:r>
+          </a:p>
+          <a:p>
+            <a:r>
+              <a:rPr lang="es-ES" dirty="0" smtClean="0">
+                <a:latin typeface="Consolas" panose="020B0609020204030204" pitchFamily="49" charset="0"/>
+              </a:rPr>
+              <a:t>"</a:t>
+            </a:r>
+            <a:r>
+              <a:rPr lang="es-ES" dirty="0" err="1" smtClean="0">
+                <a:latin typeface="Consolas" panose="020B0609020204030204" pitchFamily="49" charset="0"/>
+              </a:rPr>
+              <a:t>isFat</a:t>
+            </a:r>
+            <a:r>
+              <a:rPr lang="es-ES" dirty="0" smtClean="0">
+                <a:latin typeface="Consolas" panose="020B0609020204030204" pitchFamily="49" charset="0"/>
+              </a:rPr>
+              <a:t>":true,</a:t>
+            </a:r>
+          </a:p>
+          <a:p>
+            <a:r>
+              <a:rPr lang="es-ES" dirty="0" smtClean="0">
+                <a:latin typeface="Consolas" panose="020B0609020204030204" pitchFamily="49" charset="0"/>
+              </a:rPr>
+              <a:t>}</a:t>
+            </a:r>
+          </a:p>
+          <a:p>
+            <a:r>
+              <a:rPr lang="es-ES" dirty="0" smtClean="0">
+                <a:latin typeface="Consolas" panose="020B0609020204030204" pitchFamily="49" charset="0"/>
+              </a:rPr>
+              <a:t>}</a:t>
+            </a:r>
+            <a:endParaRPr lang="es-ES" dirty="0">
+              <a:latin typeface="Consolas" panose="020B0609020204030204" pitchFamily="49" charset="0"/>
+            </a:endParaRPr>
+          </a:p>
+        </p:txBody>
+      </p:sp>
+    </p:spTree>
+    <p:extLst>
+      <p:ext uri="{BB962C8B-B14F-4D97-AF65-F5344CB8AC3E}">
+        <p14:creationId xmlns:p14="http://schemas.microsoft.com/office/powerpoint/2010/main" val="2059749569"/>
+      </p:ext>
+    </p:extLst>
+  </p:cSld>
+  <p:clrMapOvr>
+    <a:masterClrMapping/>
+  </p:clrMapOvr>
+</p:sld>
+</file>
+
+<file path=ppt/slides/slide14.xml><?xml version="1.0" encoding="utf-8"?>
+<p:sld xmlns:a="http://schemas.openxmlformats.org/drawingml/2006/main" xmlns:r="http://schemas.openxmlformats.org/officeDocument/2006/relationships" xmlns:p="http://schemas.openxmlformats.org/presentationml/2006/main">
+  <p:cSld>
+    <p:spTree>
+      <p:nvGrpSpPr>
+        <p:cNvPr id="1" name=""/>
+        <p:cNvGrpSpPr/>
+        <p:nvPr/>
+      </p:nvGrpSpPr>
+      <p:grpSpPr>
+        <a:xfrm>
+          <a:off x="0" y="0"/>
+          <a:ext cx="0" cy="0"/>
+          <a:chOff x="0" y="0"/>
+          <a:chExt cx="0" cy="0"/>
+        </a:xfrm>
+      </p:grpSpPr>
+      <p:sp>
+        <p:nvSpPr>
+          <p:cNvPr id="2" name="Título 1"/>
+          <p:cNvSpPr>
+            <a:spLocks noGrp="1"/>
+          </p:cNvSpPr>
+          <p:nvPr>
+            <p:ph type="title"/>
+          </p:nvPr>
+        </p:nvSpPr>
+        <p:spPr/>
+        <p:txBody>
+          <a:bodyPr/>
+          <a:lstStyle/>
+          <a:p>
+            <a:r>
+              <a:rPr lang="es-ES" dirty="0" smtClean="0"/>
+              <a:t>JSON</a:t>
+            </a:r>
+            <a:endParaRPr lang="es-CO" dirty="0"/>
+          </a:p>
+        </p:txBody>
+      </p:sp>
+      <p:sp>
+        <p:nvSpPr>
+          <p:cNvPr id="3" name="Marcador de contenido 2"/>
+          <p:cNvSpPr>
+            <a:spLocks noGrp="1"/>
+          </p:cNvSpPr>
+          <p:nvPr>
+            <p:ph idx="1"/>
+          </p:nvPr>
+        </p:nvSpPr>
+        <p:spPr>
+          <a:xfrm>
+            <a:off x="1097280" y="3028336"/>
+            <a:ext cx="4782410" cy="2840758"/>
+          </a:xfrm>
+        </p:spPr>
+        <p:txBody>
+          <a:bodyPr/>
+          <a:lstStyle/>
+          <a:p>
+            <a:pPr marL="0" indent="0">
+              <a:buNone/>
+            </a:pPr>
+            <a:r>
+              <a:rPr lang="es-ES" dirty="0" smtClean="0"/>
+              <a:t>Un arreglo puede ser valor de una clave</a:t>
+            </a:r>
+            <a:endParaRPr lang="es-ES" b="1" dirty="0"/>
+          </a:p>
+        </p:txBody>
+      </p:sp>
+      <p:sp>
+        <p:nvSpPr>
+          <p:cNvPr id="5" name="Marcador de contenido 2"/>
+          <p:cNvSpPr txBox="1">
+            <a:spLocks/>
+          </p:cNvSpPr>
+          <p:nvPr/>
+        </p:nvSpPr>
+        <p:spPr>
+          <a:xfrm>
+            <a:off x="6740996" y="1966452"/>
+            <a:ext cx="5451004" cy="4119715"/>
+          </a:xfrm>
+          <a:prstGeom prst="rect">
+            <a:avLst/>
+          </a:prstGeom>
+        </p:spPr>
+        <p:txBody>
+          <a:bodyPr vert="horz" lIns="0" tIns="45720" rIns="0" bIns="45720" rtlCol="0">
+            <a:normAutofit/>
+          </a:bodyPr>
+          <a:lstStyle>
+            <a:lvl1pPr marL="91440" indent="-91440" algn="l" defTabSz="914400" rtl="0" eaLnBrk="1" latinLnBrk="0" hangingPunct="1">
+              <a:lnSpc>
+                <a:spcPct val="90000"/>
+              </a:lnSpc>
+              <a:spcBef>
+                <a:spcPts val="1200"/>
+              </a:spcBef>
+              <a:spcAft>
+                <a:spcPts val="200"/>
+              </a:spcAft>
+              <a:buClr>
+                <a:schemeClr val="accent1"/>
+              </a:buClr>
+              <a:buSzPct val="100000"/>
+              <a:buFont typeface="Calibri" panose="020F0502020204030204" pitchFamily="34" charset="0"/>
+              <a:buChar char=" "/>
+              <a:defRPr sz="2000" kern="1200">
+                <a:solidFill>
+                  <a:schemeClr val="tx1">
+                    <a:lumMod val="75000"/>
+                    <a:lumOff val="25000"/>
+                  </a:schemeClr>
+                </a:solidFill>
+                <a:latin typeface="+mn-lt"/>
+                <a:ea typeface="+mn-ea"/>
+                <a:cs typeface="+mn-cs"/>
+              </a:defRPr>
+            </a:lvl1pPr>
+            <a:lvl2pPr marL="384048" indent="-182880" algn="l" defTabSz="914400" rtl="0" eaLnBrk="1" latinLnBrk="0" hangingPunct="1">
+              <a:lnSpc>
+                <a:spcPct val="90000"/>
+              </a:lnSpc>
+              <a:spcBef>
+                <a:spcPts val="200"/>
+              </a:spcBef>
+              <a:spcAft>
+                <a:spcPts val="400"/>
+              </a:spcAft>
+              <a:buClr>
+                <a:schemeClr val="accent1"/>
+              </a:buClr>
+              <a:buFont typeface="Calibri" pitchFamily="34" charset="0"/>
+              <a:buChar char="◦"/>
+              <a:defRPr sz="1800" kern="1200">
+                <a:solidFill>
+                  <a:schemeClr val="tx1">
+                    <a:lumMod val="75000"/>
+                    <a:lumOff val="25000"/>
+                  </a:schemeClr>
+                </a:solidFill>
+                <a:latin typeface="+mn-lt"/>
+                <a:ea typeface="+mn-ea"/>
+                <a:cs typeface="+mn-cs"/>
+              </a:defRPr>
+            </a:lvl2pPr>
+            <a:lvl3pPr marL="566928" indent="-182880" algn="l" defTabSz="914400" rtl="0" eaLnBrk="1" latinLnBrk="0" hangingPunct="1">
+              <a:lnSpc>
+                <a:spcPct val="90000"/>
+              </a:lnSpc>
+              <a:spcBef>
+                <a:spcPts val="200"/>
+              </a:spcBef>
+              <a:spcAft>
+                <a:spcPts val="400"/>
+              </a:spcAft>
+              <a:buClr>
+                <a:schemeClr val="accent1"/>
+              </a:buClr>
+              <a:buFont typeface="Calibri" pitchFamily="34" charset="0"/>
+              <a:buChar char="◦"/>
+              <a:defRPr sz="1400" kern="1200">
+                <a:solidFill>
+                  <a:schemeClr val="tx1">
+                    <a:lumMod val="75000"/>
+                    <a:lumOff val="25000"/>
+                  </a:schemeClr>
+                </a:solidFill>
+                <a:latin typeface="+mn-lt"/>
+                <a:ea typeface="+mn-ea"/>
+                <a:cs typeface="+mn-cs"/>
+              </a:defRPr>
+            </a:lvl3pPr>
+            <a:lvl4pPr marL="749808" indent="-182880" algn="l" defTabSz="914400" rtl="0" eaLnBrk="1" latinLnBrk="0" hangingPunct="1">
+              <a:lnSpc>
+                <a:spcPct val="90000"/>
+              </a:lnSpc>
+              <a:spcBef>
+                <a:spcPts val="200"/>
+              </a:spcBef>
+              <a:spcAft>
+                <a:spcPts val="400"/>
+              </a:spcAft>
+              <a:buClr>
+                <a:schemeClr val="accent1"/>
+              </a:buClr>
+              <a:buFont typeface="Calibri" pitchFamily="34" charset="0"/>
+              <a:buChar char="◦"/>
+              <a:defRPr sz="1400" kern="1200">
+                <a:solidFill>
+                  <a:schemeClr val="tx1">
+                    <a:lumMod val="75000"/>
+                    <a:lumOff val="25000"/>
+                  </a:schemeClr>
+                </a:solidFill>
+                <a:latin typeface="+mn-lt"/>
+                <a:ea typeface="+mn-ea"/>
+                <a:cs typeface="+mn-cs"/>
+              </a:defRPr>
+            </a:lvl4pPr>
+            <a:lvl5pPr marL="932688" indent="-182880" algn="l" defTabSz="914400" rtl="0" eaLnBrk="1" latinLnBrk="0" hangingPunct="1">
+              <a:lnSpc>
+                <a:spcPct val="90000"/>
+              </a:lnSpc>
+              <a:spcBef>
+                <a:spcPts val="200"/>
+              </a:spcBef>
+              <a:spcAft>
+                <a:spcPts val="400"/>
+              </a:spcAft>
+              <a:buClr>
+                <a:schemeClr val="accent1"/>
+              </a:buClr>
+              <a:buFont typeface="Calibri" pitchFamily="34" charset="0"/>
+              <a:buChar char="◦"/>
+              <a:defRPr sz="1400" kern="1200">
+                <a:solidFill>
+                  <a:schemeClr val="tx1">
+                    <a:lumMod val="75000"/>
+                    <a:lumOff val="25000"/>
+                  </a:schemeClr>
+                </a:solidFill>
+                <a:latin typeface="+mn-lt"/>
+                <a:ea typeface="+mn-ea"/>
+                <a:cs typeface="+mn-cs"/>
+              </a:defRPr>
+            </a:lvl5pPr>
+            <a:lvl6pPr marL="1100000" indent="-228600" algn="l" defTabSz="914400" rtl="0" eaLnBrk="1" latinLnBrk="0" hangingPunct="1">
+              <a:lnSpc>
+                <a:spcPct val="90000"/>
+              </a:lnSpc>
+              <a:spcBef>
+                <a:spcPts val="200"/>
+              </a:spcBef>
+              <a:spcAft>
+                <a:spcPts val="400"/>
+              </a:spcAft>
+              <a:buClr>
+                <a:schemeClr val="accent1"/>
+              </a:buClr>
+              <a:buFont typeface="Calibri" pitchFamily="34" charset="0"/>
+              <a:buChar char="◦"/>
+              <a:defRPr sz="1400" kern="1200">
+                <a:solidFill>
+                  <a:schemeClr val="tx1">
+                    <a:lumMod val="75000"/>
+                    <a:lumOff val="25000"/>
+                  </a:schemeClr>
+                </a:solidFill>
+                <a:latin typeface="+mn-lt"/>
+                <a:ea typeface="+mn-ea"/>
+                <a:cs typeface="+mn-cs"/>
+              </a:defRPr>
+            </a:lvl6pPr>
+            <a:lvl7pPr marL="1300000" indent="-228600" algn="l" defTabSz="914400" rtl="0" eaLnBrk="1" latinLnBrk="0" hangingPunct="1">
+              <a:lnSpc>
+                <a:spcPct val="90000"/>
+              </a:lnSpc>
+              <a:spcBef>
+                <a:spcPts val="200"/>
+              </a:spcBef>
+              <a:spcAft>
+                <a:spcPts val="400"/>
+              </a:spcAft>
+              <a:buClr>
+                <a:schemeClr val="accent1"/>
+              </a:buClr>
+              <a:buFont typeface="Calibri" pitchFamily="34" charset="0"/>
+              <a:buChar char="◦"/>
+              <a:defRPr sz="1400" kern="1200">
+                <a:solidFill>
+                  <a:schemeClr val="tx1">
+                    <a:lumMod val="75000"/>
+                    <a:lumOff val="25000"/>
+                  </a:schemeClr>
+                </a:solidFill>
+                <a:latin typeface="+mn-lt"/>
+                <a:ea typeface="+mn-ea"/>
+                <a:cs typeface="+mn-cs"/>
+              </a:defRPr>
+            </a:lvl7pPr>
+            <a:lvl8pPr marL="1500000" indent="-228600" algn="l" defTabSz="914400" rtl="0" eaLnBrk="1" latinLnBrk="0" hangingPunct="1">
+              <a:lnSpc>
+                <a:spcPct val="90000"/>
+              </a:lnSpc>
+              <a:spcBef>
+                <a:spcPts val="200"/>
+              </a:spcBef>
+              <a:spcAft>
+                <a:spcPts val="400"/>
+              </a:spcAft>
+              <a:buClr>
+                <a:schemeClr val="accent1"/>
+              </a:buClr>
+              <a:buFont typeface="Calibri" pitchFamily="34" charset="0"/>
+              <a:buChar char="◦"/>
+              <a:defRPr sz="1400" kern="1200">
+                <a:solidFill>
+                  <a:schemeClr val="tx1">
+                    <a:lumMod val="75000"/>
+                    <a:lumOff val="25000"/>
+                  </a:schemeClr>
+                </a:solidFill>
+                <a:latin typeface="+mn-lt"/>
+                <a:ea typeface="+mn-ea"/>
+                <a:cs typeface="+mn-cs"/>
+              </a:defRPr>
+            </a:lvl8pPr>
+            <a:lvl9pPr marL="1700000" indent="-228600" algn="l" defTabSz="914400" rtl="0" eaLnBrk="1" latinLnBrk="0" hangingPunct="1">
+              <a:lnSpc>
+                <a:spcPct val="90000"/>
+              </a:lnSpc>
+              <a:spcBef>
+                <a:spcPts val="200"/>
+              </a:spcBef>
+              <a:spcAft>
+                <a:spcPts val="400"/>
+              </a:spcAft>
+              <a:buClr>
+                <a:schemeClr val="accent1"/>
+              </a:buClr>
+              <a:buFont typeface="Calibri" pitchFamily="34" charset="0"/>
+              <a:buChar char="◦"/>
+              <a:defRPr sz="1400" kern="1200">
+                <a:solidFill>
+                  <a:schemeClr val="tx1">
+                    <a:lumMod val="75000"/>
+                    <a:lumOff val="25000"/>
+                  </a:schemeClr>
+                </a:solidFill>
+                <a:latin typeface="+mn-lt"/>
+                <a:ea typeface="+mn-ea"/>
+                <a:cs typeface="+mn-cs"/>
+              </a:defRPr>
+            </a:lvl9pPr>
+          </a:lstStyle>
+          <a:p>
+            <a:r>
+              <a:rPr lang="es-ES" dirty="0" smtClean="0">
+                <a:latin typeface="Consolas" panose="020B0609020204030204" pitchFamily="49" charset="0"/>
+              </a:rPr>
+              <a:t>{</a:t>
+            </a:r>
+          </a:p>
+          <a:p>
+            <a:r>
+              <a:rPr lang="es-ES" dirty="0" smtClean="0">
+                <a:latin typeface="Consolas" panose="020B0609020204030204" pitchFamily="49" charset="0"/>
+              </a:rPr>
+              <a:t>"estudiantes":[</a:t>
+            </a:r>
+          </a:p>
+          <a:p>
+            <a:r>
+              <a:rPr lang="es-ES" dirty="0" smtClean="0">
+                <a:latin typeface="Consolas" panose="020B0609020204030204" pitchFamily="49" charset="0"/>
+              </a:rPr>
+              <a:t>"Christian",</a:t>
+            </a:r>
+          </a:p>
+          <a:p>
+            <a:r>
+              <a:rPr lang="es-ES" dirty="0" smtClean="0">
+                <a:latin typeface="Consolas" panose="020B0609020204030204" pitchFamily="49" charset="0"/>
+              </a:rPr>
+              <a:t>"Jefferson",</a:t>
+            </a:r>
+            <a:endParaRPr lang="es-ES" dirty="0">
+              <a:latin typeface="Consolas" panose="020B0609020204030204" pitchFamily="49" charset="0"/>
+            </a:endParaRPr>
+          </a:p>
+          <a:p>
+            <a:r>
+              <a:rPr lang="es-ES" dirty="0" smtClean="0">
+                <a:latin typeface="Consolas" panose="020B0609020204030204" pitchFamily="49" charset="0"/>
+              </a:rPr>
+              <a:t>"Daniel",</a:t>
+            </a:r>
+            <a:endParaRPr lang="es-ES" dirty="0">
+              <a:latin typeface="Consolas" panose="020B0609020204030204" pitchFamily="49" charset="0"/>
+            </a:endParaRPr>
+          </a:p>
+          <a:p>
+            <a:r>
+              <a:rPr lang="es-ES" dirty="0" smtClean="0">
+                <a:latin typeface="Consolas" panose="020B0609020204030204" pitchFamily="49" charset="0"/>
+              </a:rPr>
+              <a:t>"Nicolás"]</a:t>
+            </a:r>
+          </a:p>
+          <a:p>
+            <a:r>
+              <a:rPr lang="es-ES" dirty="0">
+                <a:latin typeface="Consolas" panose="020B0609020204030204" pitchFamily="49" charset="0"/>
+              </a:rPr>
+              <a:t>}</a:t>
+            </a:r>
+          </a:p>
+        </p:txBody>
+      </p:sp>
+    </p:spTree>
+    <p:extLst>
+      <p:ext uri="{BB962C8B-B14F-4D97-AF65-F5344CB8AC3E}">
+        <p14:creationId xmlns:p14="http://schemas.microsoft.com/office/powerpoint/2010/main" val="79221083"/>
+      </p:ext>
+    </p:extLst>
+  </p:cSld>
+  <p:clrMapOvr>
+    <a:masterClrMapping/>
+  </p:clrMapOvr>
+</p:sld>
+</file>
+
+<file path=ppt/slides/slide15.xml><?xml version="1.0" encoding="utf-8"?>
+<p:sld xmlns:a="http://schemas.openxmlformats.org/drawingml/2006/main" xmlns:r="http://schemas.openxmlformats.org/officeDocument/2006/relationships" xmlns:p="http://schemas.openxmlformats.org/presentationml/2006/main">
+  <p:cSld>
+    <p:spTree>
+      <p:nvGrpSpPr>
+        <p:cNvPr id="1" name=""/>
+        <p:cNvGrpSpPr/>
+        <p:nvPr/>
+      </p:nvGrpSpPr>
+      <p:grpSpPr>
+        <a:xfrm>
+          <a:off x="0" y="0"/>
+          <a:ext cx="0" cy="0"/>
+          <a:chOff x="0" y="0"/>
+          <a:chExt cx="0" cy="0"/>
+        </a:xfrm>
+      </p:grpSpPr>
+      <p:sp>
+        <p:nvSpPr>
+          <p:cNvPr id="2" name="Título 1"/>
+          <p:cNvSpPr>
+            <a:spLocks noGrp="1"/>
+          </p:cNvSpPr>
+          <p:nvPr>
+            <p:ph type="title"/>
+          </p:nvPr>
+        </p:nvSpPr>
+        <p:spPr/>
+        <p:txBody>
+          <a:bodyPr/>
+          <a:lstStyle/>
+          <a:p>
+            <a:r>
+              <a:rPr lang="es-ES" dirty="0" smtClean="0"/>
+              <a:t>JSON</a:t>
+            </a:r>
+            <a:endParaRPr lang="es-CO" dirty="0"/>
+          </a:p>
+        </p:txBody>
+      </p:sp>
+      <p:sp>
+        <p:nvSpPr>
+          <p:cNvPr id="3" name="Marcador de contenido 2"/>
+          <p:cNvSpPr>
+            <a:spLocks noGrp="1"/>
+          </p:cNvSpPr>
+          <p:nvPr>
+            <p:ph idx="1"/>
+          </p:nvPr>
+        </p:nvSpPr>
+        <p:spPr>
+          <a:xfrm>
+            <a:off x="1097280" y="3028336"/>
+            <a:ext cx="4782410" cy="2840758"/>
+          </a:xfrm>
+        </p:spPr>
+        <p:txBody>
+          <a:bodyPr/>
+          <a:lstStyle/>
+          <a:p>
+            <a:pPr marL="0" indent="0">
+              <a:buNone/>
+            </a:pPr>
+            <a:r>
+              <a:rPr lang="es-ES" dirty="0" smtClean="0"/>
+              <a:t>Todo combinado</a:t>
+            </a:r>
+            <a:endParaRPr lang="es-ES" b="1" dirty="0"/>
+          </a:p>
+        </p:txBody>
+      </p:sp>
+      <p:sp>
+        <p:nvSpPr>
+          <p:cNvPr id="5" name="Marcador de contenido 2"/>
+          <p:cNvSpPr txBox="1">
+            <a:spLocks/>
+          </p:cNvSpPr>
+          <p:nvPr/>
+        </p:nvSpPr>
+        <p:spPr>
+          <a:xfrm>
+            <a:off x="6740996" y="1966452"/>
+            <a:ext cx="5451004" cy="4119715"/>
+          </a:xfrm>
+          <a:prstGeom prst="rect">
+            <a:avLst/>
+          </a:prstGeom>
+        </p:spPr>
+        <p:txBody>
+          <a:bodyPr vert="horz" lIns="0" tIns="45720" rIns="0" bIns="45720" rtlCol="0">
+            <a:normAutofit fontScale="92500" lnSpcReduction="20000"/>
+          </a:bodyPr>
+          <a:lstStyle>
+            <a:lvl1pPr marL="91440" indent="-91440" algn="l" defTabSz="914400" rtl="0" eaLnBrk="1" latinLnBrk="0" hangingPunct="1">
+              <a:lnSpc>
+                <a:spcPct val="90000"/>
+              </a:lnSpc>
+              <a:spcBef>
+                <a:spcPts val="1200"/>
+              </a:spcBef>
+              <a:spcAft>
+                <a:spcPts val="200"/>
+              </a:spcAft>
+              <a:buClr>
+                <a:schemeClr val="accent1"/>
+              </a:buClr>
+              <a:buSzPct val="100000"/>
+              <a:buFont typeface="Calibri" panose="020F0502020204030204" pitchFamily="34" charset="0"/>
+              <a:buChar char=" "/>
+              <a:defRPr sz="2000" kern="1200">
+                <a:solidFill>
+                  <a:schemeClr val="tx1">
+                    <a:lumMod val="75000"/>
+                    <a:lumOff val="25000"/>
+                  </a:schemeClr>
+                </a:solidFill>
+                <a:latin typeface="+mn-lt"/>
+                <a:ea typeface="+mn-ea"/>
+                <a:cs typeface="+mn-cs"/>
+              </a:defRPr>
+            </a:lvl1pPr>
+            <a:lvl2pPr marL="384048" indent="-182880" algn="l" defTabSz="914400" rtl="0" eaLnBrk="1" latinLnBrk="0" hangingPunct="1">
+              <a:lnSpc>
+                <a:spcPct val="90000"/>
+              </a:lnSpc>
+              <a:spcBef>
+                <a:spcPts val="200"/>
+              </a:spcBef>
+              <a:spcAft>
+                <a:spcPts val="400"/>
+              </a:spcAft>
+              <a:buClr>
+                <a:schemeClr val="accent1"/>
+              </a:buClr>
+              <a:buFont typeface="Calibri" pitchFamily="34" charset="0"/>
+              <a:buChar char="◦"/>
+              <a:defRPr sz="1800" kern="1200">
+                <a:solidFill>
+                  <a:schemeClr val="tx1">
+                    <a:lumMod val="75000"/>
+                    <a:lumOff val="25000"/>
+                  </a:schemeClr>
+                </a:solidFill>
+                <a:latin typeface="+mn-lt"/>
+                <a:ea typeface="+mn-ea"/>
+                <a:cs typeface="+mn-cs"/>
+              </a:defRPr>
+            </a:lvl2pPr>
+            <a:lvl3pPr marL="566928" indent="-182880" algn="l" defTabSz="914400" rtl="0" eaLnBrk="1" latinLnBrk="0" hangingPunct="1">
+              <a:lnSpc>
+                <a:spcPct val="90000"/>
+              </a:lnSpc>
+              <a:spcBef>
+                <a:spcPts val="200"/>
+              </a:spcBef>
+              <a:spcAft>
+                <a:spcPts val="400"/>
+              </a:spcAft>
+              <a:buClr>
+                <a:schemeClr val="accent1"/>
+              </a:buClr>
+              <a:buFont typeface="Calibri" pitchFamily="34" charset="0"/>
+              <a:buChar char="◦"/>
+              <a:defRPr sz="1400" kern="1200">
+                <a:solidFill>
+                  <a:schemeClr val="tx1">
+                    <a:lumMod val="75000"/>
+                    <a:lumOff val="25000"/>
+                  </a:schemeClr>
+                </a:solidFill>
+                <a:latin typeface="+mn-lt"/>
+                <a:ea typeface="+mn-ea"/>
+                <a:cs typeface="+mn-cs"/>
+              </a:defRPr>
+            </a:lvl3pPr>
+            <a:lvl4pPr marL="749808" indent="-182880" algn="l" defTabSz="914400" rtl="0" eaLnBrk="1" latinLnBrk="0" hangingPunct="1">
+              <a:lnSpc>
+                <a:spcPct val="90000"/>
+              </a:lnSpc>
+              <a:spcBef>
+                <a:spcPts val="200"/>
+              </a:spcBef>
+              <a:spcAft>
+                <a:spcPts val="400"/>
+              </a:spcAft>
+              <a:buClr>
+                <a:schemeClr val="accent1"/>
+              </a:buClr>
+              <a:buFont typeface="Calibri" pitchFamily="34" charset="0"/>
+              <a:buChar char="◦"/>
+              <a:defRPr sz="1400" kern="1200">
+                <a:solidFill>
+                  <a:schemeClr val="tx1">
+                    <a:lumMod val="75000"/>
+                    <a:lumOff val="25000"/>
+                  </a:schemeClr>
+                </a:solidFill>
+                <a:latin typeface="+mn-lt"/>
+                <a:ea typeface="+mn-ea"/>
+                <a:cs typeface="+mn-cs"/>
+              </a:defRPr>
+            </a:lvl4pPr>
+            <a:lvl5pPr marL="932688" indent="-182880" algn="l" defTabSz="914400" rtl="0" eaLnBrk="1" latinLnBrk="0" hangingPunct="1">
+              <a:lnSpc>
+                <a:spcPct val="90000"/>
+              </a:lnSpc>
+              <a:spcBef>
+                <a:spcPts val="200"/>
+              </a:spcBef>
+              <a:spcAft>
+                <a:spcPts val="400"/>
+              </a:spcAft>
+              <a:buClr>
+                <a:schemeClr val="accent1"/>
+              </a:buClr>
+              <a:buFont typeface="Calibri" pitchFamily="34" charset="0"/>
+              <a:buChar char="◦"/>
+              <a:defRPr sz="1400" kern="1200">
+                <a:solidFill>
+                  <a:schemeClr val="tx1">
+                    <a:lumMod val="75000"/>
+                    <a:lumOff val="25000"/>
+                  </a:schemeClr>
+                </a:solidFill>
+                <a:latin typeface="+mn-lt"/>
+                <a:ea typeface="+mn-ea"/>
+                <a:cs typeface="+mn-cs"/>
+              </a:defRPr>
+            </a:lvl5pPr>
+            <a:lvl6pPr marL="1100000" indent="-228600" algn="l" defTabSz="914400" rtl="0" eaLnBrk="1" latinLnBrk="0" hangingPunct="1">
+              <a:lnSpc>
+                <a:spcPct val="90000"/>
+              </a:lnSpc>
+              <a:spcBef>
+                <a:spcPts val="200"/>
+              </a:spcBef>
+              <a:spcAft>
+                <a:spcPts val="400"/>
+              </a:spcAft>
+              <a:buClr>
+                <a:schemeClr val="accent1"/>
+              </a:buClr>
+              <a:buFont typeface="Calibri" pitchFamily="34" charset="0"/>
+              <a:buChar char="◦"/>
+              <a:defRPr sz="1400" kern="1200">
+                <a:solidFill>
+                  <a:schemeClr val="tx1">
+                    <a:lumMod val="75000"/>
+                    <a:lumOff val="25000"/>
+                  </a:schemeClr>
+                </a:solidFill>
+                <a:latin typeface="+mn-lt"/>
+                <a:ea typeface="+mn-ea"/>
+                <a:cs typeface="+mn-cs"/>
+              </a:defRPr>
+            </a:lvl6pPr>
+            <a:lvl7pPr marL="1300000" indent="-228600" algn="l" defTabSz="914400" rtl="0" eaLnBrk="1" latinLnBrk="0" hangingPunct="1">
+              <a:lnSpc>
+                <a:spcPct val="90000"/>
+              </a:lnSpc>
+              <a:spcBef>
+                <a:spcPts val="200"/>
+              </a:spcBef>
+              <a:spcAft>
+                <a:spcPts val="400"/>
+              </a:spcAft>
+              <a:buClr>
+                <a:schemeClr val="accent1"/>
+              </a:buClr>
+              <a:buFont typeface="Calibri" pitchFamily="34" charset="0"/>
+              <a:buChar char="◦"/>
+              <a:defRPr sz="1400" kern="1200">
+                <a:solidFill>
+                  <a:schemeClr val="tx1">
+                    <a:lumMod val="75000"/>
+                    <a:lumOff val="25000"/>
+                  </a:schemeClr>
+                </a:solidFill>
+                <a:latin typeface="+mn-lt"/>
+                <a:ea typeface="+mn-ea"/>
+                <a:cs typeface="+mn-cs"/>
+              </a:defRPr>
+            </a:lvl7pPr>
+            <a:lvl8pPr marL="1500000" indent="-228600" algn="l" defTabSz="914400" rtl="0" eaLnBrk="1" latinLnBrk="0" hangingPunct="1">
+              <a:lnSpc>
+                <a:spcPct val="90000"/>
+              </a:lnSpc>
+              <a:spcBef>
+                <a:spcPts val="200"/>
+              </a:spcBef>
+              <a:spcAft>
+                <a:spcPts val="400"/>
+              </a:spcAft>
+              <a:buClr>
+                <a:schemeClr val="accent1"/>
+              </a:buClr>
+              <a:buFont typeface="Calibri" pitchFamily="34" charset="0"/>
+              <a:buChar char="◦"/>
+              <a:defRPr sz="1400" kern="1200">
+                <a:solidFill>
+                  <a:schemeClr val="tx1">
+                    <a:lumMod val="75000"/>
+                    <a:lumOff val="25000"/>
+                  </a:schemeClr>
+                </a:solidFill>
+                <a:latin typeface="+mn-lt"/>
+                <a:ea typeface="+mn-ea"/>
+                <a:cs typeface="+mn-cs"/>
+              </a:defRPr>
+            </a:lvl8pPr>
+            <a:lvl9pPr marL="1700000" indent="-228600" algn="l" defTabSz="914400" rtl="0" eaLnBrk="1" latinLnBrk="0" hangingPunct="1">
+              <a:lnSpc>
+                <a:spcPct val="90000"/>
+              </a:lnSpc>
+              <a:spcBef>
+                <a:spcPts val="200"/>
+              </a:spcBef>
+              <a:spcAft>
+                <a:spcPts val="400"/>
+              </a:spcAft>
+              <a:buClr>
+                <a:schemeClr val="accent1"/>
+              </a:buClr>
+              <a:buFont typeface="Calibri" pitchFamily="34" charset="0"/>
+              <a:buChar char="◦"/>
+              <a:defRPr sz="1400" kern="1200">
+                <a:solidFill>
+                  <a:schemeClr val="tx1">
+                    <a:lumMod val="75000"/>
+                    <a:lumOff val="25000"/>
+                  </a:schemeClr>
+                </a:solidFill>
+                <a:latin typeface="+mn-lt"/>
+                <a:ea typeface="+mn-ea"/>
+                <a:cs typeface="+mn-cs"/>
+              </a:defRPr>
+            </a:lvl9pPr>
+          </a:lstStyle>
+          <a:p>
+            <a:r>
+              <a:rPr lang="es-ES" dirty="0">
+                <a:latin typeface="Consolas" panose="020B0609020204030204" pitchFamily="49" charset="0"/>
+              </a:rPr>
+              <a:t>{</a:t>
+            </a:r>
+          </a:p>
+          <a:p>
+            <a:r>
+              <a:rPr lang="es-ES" dirty="0">
+                <a:latin typeface="Consolas" panose="020B0609020204030204" pitchFamily="49" charset="0"/>
+              </a:rPr>
+              <a:t>"</a:t>
+            </a:r>
+            <a:r>
+              <a:rPr lang="es-ES" dirty="0" err="1">
+                <a:latin typeface="Consolas" panose="020B0609020204030204" pitchFamily="49" charset="0"/>
+              </a:rPr>
+              <a:t>seleccion</a:t>
+            </a:r>
+            <a:r>
+              <a:rPr lang="es-ES" dirty="0">
+                <a:latin typeface="Consolas" panose="020B0609020204030204" pitchFamily="49" charset="0"/>
+              </a:rPr>
+              <a:t>":{</a:t>
+            </a:r>
+          </a:p>
+          <a:p>
+            <a:r>
+              <a:rPr lang="es-ES" dirty="0">
+                <a:latin typeface="Consolas" panose="020B0609020204030204" pitchFamily="49" charset="0"/>
+              </a:rPr>
+              <a:t>"</a:t>
+            </a:r>
+            <a:r>
+              <a:rPr lang="es-ES" dirty="0" err="1">
+                <a:latin typeface="Consolas" panose="020B0609020204030204" pitchFamily="49" charset="0"/>
+              </a:rPr>
+              <a:t>tecnico</a:t>
+            </a:r>
+            <a:r>
+              <a:rPr lang="es-ES" dirty="0">
+                <a:latin typeface="Consolas" panose="020B0609020204030204" pitchFamily="49" charset="0"/>
+              </a:rPr>
+              <a:t>":{"</a:t>
+            </a:r>
+            <a:r>
+              <a:rPr lang="es-ES" dirty="0" err="1">
+                <a:latin typeface="Consolas" panose="020B0609020204030204" pitchFamily="49" charset="0"/>
+              </a:rPr>
+              <a:t>nombre":"Carlos</a:t>
+            </a:r>
+            <a:r>
+              <a:rPr lang="es-ES" dirty="0">
+                <a:latin typeface="Consolas" panose="020B0609020204030204" pitchFamily="49" charset="0"/>
+              </a:rPr>
+              <a:t> </a:t>
+            </a:r>
+            <a:r>
+              <a:rPr lang="es-ES" dirty="0" err="1">
+                <a:latin typeface="Consolas" panose="020B0609020204030204" pitchFamily="49" charset="0"/>
+              </a:rPr>
+              <a:t>Queiroz</a:t>
+            </a:r>
+            <a:r>
+              <a:rPr lang="es-ES" dirty="0">
+                <a:latin typeface="Consolas" panose="020B0609020204030204" pitchFamily="49" charset="0"/>
+              </a:rPr>
+              <a:t>","</a:t>
+            </a:r>
+            <a:r>
+              <a:rPr lang="es-ES" dirty="0" err="1">
+                <a:latin typeface="Consolas" panose="020B0609020204030204" pitchFamily="49" charset="0"/>
+              </a:rPr>
+              <a:t>nacionalidad":"Portugal</a:t>
+            </a:r>
+            <a:r>
+              <a:rPr lang="es-ES" dirty="0">
+                <a:latin typeface="Consolas" panose="020B0609020204030204" pitchFamily="49" charset="0"/>
+              </a:rPr>
+              <a:t>"},</a:t>
+            </a:r>
+          </a:p>
+          <a:p>
+            <a:r>
+              <a:rPr lang="es-ES" dirty="0">
+                <a:latin typeface="Consolas" panose="020B0609020204030204" pitchFamily="49" charset="0"/>
+              </a:rPr>
+              <a:t>"jugadores":[</a:t>
+            </a:r>
+          </a:p>
+          <a:p>
+            <a:r>
+              <a:rPr lang="es-ES" dirty="0">
+                <a:latin typeface="Consolas" panose="020B0609020204030204" pitchFamily="49" charset="0"/>
+              </a:rPr>
+              <a:t>{"</a:t>
+            </a:r>
+            <a:r>
+              <a:rPr lang="es-ES" dirty="0" err="1">
+                <a:latin typeface="Consolas" panose="020B0609020204030204" pitchFamily="49" charset="0"/>
+              </a:rPr>
+              <a:t>nombre":"James</a:t>
+            </a:r>
+            <a:r>
+              <a:rPr lang="es-ES" dirty="0">
+                <a:latin typeface="Consolas" panose="020B0609020204030204" pitchFamily="49" charset="0"/>
+              </a:rPr>
+              <a:t> </a:t>
+            </a:r>
+            <a:r>
+              <a:rPr lang="es-ES" dirty="0" err="1">
+                <a:latin typeface="Consolas" panose="020B0609020204030204" pitchFamily="49" charset="0"/>
+              </a:rPr>
+              <a:t>Rodriguez</a:t>
+            </a:r>
+            <a:r>
+              <a:rPr lang="es-ES" dirty="0">
+                <a:latin typeface="Consolas" panose="020B0609020204030204" pitchFamily="49" charset="0"/>
+              </a:rPr>
+              <a:t>","</a:t>
+            </a:r>
+            <a:r>
+              <a:rPr lang="es-ES" dirty="0" err="1">
+                <a:latin typeface="Consolas" panose="020B0609020204030204" pitchFamily="49" charset="0"/>
+              </a:rPr>
+              <a:t>club":"</a:t>
+            </a:r>
+            <a:r>
+              <a:rPr lang="es-ES" dirty="0" err="1" smtClean="0">
+                <a:latin typeface="Consolas" panose="020B0609020204030204" pitchFamily="49" charset="0"/>
+              </a:rPr>
+              <a:t>Bayern</a:t>
+            </a:r>
+            <a:r>
+              <a:rPr lang="es-ES" dirty="0" smtClean="0">
+                <a:latin typeface="Consolas" panose="020B0609020204030204" pitchFamily="49" charset="0"/>
+              </a:rPr>
+              <a:t> </a:t>
+            </a:r>
+            <a:r>
+              <a:rPr lang="es-ES" dirty="0" err="1" smtClean="0">
+                <a:latin typeface="Consolas" panose="020B0609020204030204" pitchFamily="49" charset="0"/>
+              </a:rPr>
+              <a:t>Munich</a:t>
+            </a:r>
+            <a:r>
+              <a:rPr lang="es-ES" dirty="0" smtClean="0">
+                <a:latin typeface="Consolas" panose="020B0609020204030204" pitchFamily="49" charset="0"/>
+              </a:rPr>
+              <a:t>"},</a:t>
+            </a:r>
+            <a:endParaRPr lang="es-ES" dirty="0">
+              <a:latin typeface="Consolas" panose="020B0609020204030204" pitchFamily="49" charset="0"/>
+            </a:endParaRPr>
+          </a:p>
+          <a:p>
+            <a:r>
+              <a:rPr lang="es-ES" dirty="0">
+                <a:latin typeface="Consolas" panose="020B0609020204030204" pitchFamily="49" charset="0"/>
+              </a:rPr>
+              <a:t>{"</a:t>
+            </a:r>
+            <a:r>
+              <a:rPr lang="es-ES" dirty="0" err="1">
+                <a:latin typeface="Consolas" panose="020B0609020204030204" pitchFamily="49" charset="0"/>
+              </a:rPr>
+              <a:t>nombre":"Juan</a:t>
+            </a:r>
+            <a:r>
+              <a:rPr lang="es-ES" dirty="0">
+                <a:latin typeface="Consolas" panose="020B0609020204030204" pitchFamily="49" charset="0"/>
+              </a:rPr>
+              <a:t> Quintero","club":"</a:t>
+            </a:r>
+            <a:r>
+              <a:rPr lang="es-ES" dirty="0" err="1">
+                <a:latin typeface="Consolas" panose="020B0609020204030204" pitchFamily="49" charset="0"/>
+              </a:rPr>
+              <a:t>River</a:t>
+            </a:r>
+            <a:r>
+              <a:rPr lang="es-ES" dirty="0">
+                <a:latin typeface="Consolas" panose="020B0609020204030204" pitchFamily="49" charset="0"/>
+              </a:rPr>
+              <a:t> </a:t>
+            </a:r>
+            <a:r>
+              <a:rPr lang="es-ES" dirty="0" err="1">
+                <a:latin typeface="Consolas" panose="020B0609020204030204" pitchFamily="49" charset="0"/>
+              </a:rPr>
+              <a:t>Plate</a:t>
+            </a:r>
+            <a:r>
+              <a:rPr lang="es-ES" dirty="0">
+                <a:latin typeface="Consolas" panose="020B0609020204030204" pitchFamily="49" charset="0"/>
+              </a:rPr>
+              <a:t>"}</a:t>
+            </a:r>
+          </a:p>
+          <a:p>
+            <a:r>
+              <a:rPr lang="es-ES" dirty="0">
+                <a:latin typeface="Consolas" panose="020B0609020204030204" pitchFamily="49" charset="0"/>
+              </a:rPr>
+              <a:t>]</a:t>
+            </a:r>
+          </a:p>
+          <a:p>
+            <a:r>
+              <a:rPr lang="es-ES" dirty="0">
+                <a:latin typeface="Consolas" panose="020B0609020204030204" pitchFamily="49" charset="0"/>
+              </a:rPr>
+              <a:t>}</a:t>
+            </a:r>
+          </a:p>
+          <a:p>
+            <a:r>
+              <a:rPr lang="es-ES" dirty="0">
+                <a:latin typeface="Consolas" panose="020B0609020204030204" pitchFamily="49" charset="0"/>
+              </a:rPr>
+              <a:t>}</a:t>
+            </a:r>
+          </a:p>
+        </p:txBody>
+      </p:sp>
+    </p:spTree>
+    <p:extLst>
+      <p:ext uri="{BB962C8B-B14F-4D97-AF65-F5344CB8AC3E}">
+        <p14:creationId xmlns:p14="http://schemas.microsoft.com/office/powerpoint/2010/main" val="356547882"/>
+      </p:ext>
+    </p:extLst>
+  </p:cSld>
+  <p:clrMapOvr>
+    <a:masterClrMapping/>
+  </p:clrMapOvr>
+</p:sld>
+</file>
+
+<file path=ppt/slides/slide16.xml><?xml version="1.0" encoding="utf-8"?>
+<p:sld xmlns:a="http://schemas.openxmlformats.org/drawingml/2006/main" xmlns:r="http://schemas.openxmlformats.org/officeDocument/2006/relationships" xmlns:p="http://schemas.openxmlformats.org/presentationml/2006/main">
+  <p:cSld>
+    <p:spTree>
+      <p:nvGrpSpPr>
+        <p:cNvPr id="1" name=""/>
+        <p:cNvGrpSpPr/>
+        <p:nvPr/>
+      </p:nvGrpSpPr>
+      <p:grpSpPr>
+        <a:xfrm>
+          <a:off x="0" y="0"/>
+          <a:ext cx="0" cy="0"/>
+          <a:chOff x="0" y="0"/>
+          <a:chExt cx="0" cy="0"/>
+        </a:xfrm>
+      </p:grpSpPr>
+      <p:sp>
+        <p:nvSpPr>
+          <p:cNvPr id="2" name="Título 1"/>
+          <p:cNvSpPr>
+            <a:spLocks noGrp="1"/>
+          </p:cNvSpPr>
+          <p:nvPr>
+            <p:ph type="title"/>
+          </p:nvPr>
+        </p:nvSpPr>
+        <p:spPr/>
+        <p:txBody>
+          <a:bodyPr/>
+          <a:lstStyle/>
+          <a:p>
+            <a:r>
+              <a:rPr lang="es-ES" dirty="0" smtClean="0"/>
+              <a:t>Ejercicio</a:t>
+            </a:r>
+            <a:endParaRPr lang="es-CO" dirty="0"/>
+          </a:p>
+        </p:txBody>
+      </p:sp>
+      <p:sp>
+        <p:nvSpPr>
+          <p:cNvPr id="3" name="Marcador de contenido 2"/>
+          <p:cNvSpPr>
+            <a:spLocks noGrp="1"/>
+          </p:cNvSpPr>
+          <p:nvPr>
+            <p:ph idx="1"/>
+          </p:nvPr>
+        </p:nvSpPr>
+        <p:spPr/>
+        <p:txBody>
+          <a:bodyPr/>
+          <a:lstStyle/>
+          <a:p>
+            <a:pPr marL="0" indent="0">
+              <a:buNone/>
+            </a:pPr>
+            <a:r>
+              <a:rPr lang="es-ES" dirty="0" smtClean="0"/>
+              <a:t>Modele su semestre actual en donde incluya las asignaturas que usted está cursando</a:t>
+            </a:r>
+          </a:p>
+          <a:p>
+            <a:pPr marL="0" indent="0">
+              <a:buNone/>
+            </a:pPr>
+            <a:r>
+              <a:rPr lang="es-ES" dirty="0" smtClean="0"/>
+              <a:t>Hágalo en </a:t>
+            </a:r>
+            <a:r>
+              <a:rPr lang="es-ES"/>
+              <a:t>la página </a:t>
+            </a:r>
+            <a:br>
+              <a:rPr lang="es-ES"/>
+            </a:br>
+            <a:r>
+              <a:rPr lang="es-ES"/>
+              <a:t>http://jsonviewer.stack.hu/</a:t>
+            </a:r>
+            <a:endParaRPr lang="es-CO" dirty="0"/>
+          </a:p>
+        </p:txBody>
+      </p:sp>
+    </p:spTree>
+    <p:extLst>
+      <p:ext uri="{BB962C8B-B14F-4D97-AF65-F5344CB8AC3E}">
+        <p14:creationId xmlns:p14="http://schemas.microsoft.com/office/powerpoint/2010/main" val="1669824173"/>
+      </p:ext>
+    </p:extLst>
+  </p:cSld>
+  <p:clrMapOvr>
+    <a:masterClrMapping/>
+  </p:clrMapOvr>
 </p:sld>
 </file>
 
@@ -4332,7 +6905,12 @@
             <p:ph type="title"/>
           </p:nvPr>
         </p:nvSpPr>
-        <p:spPr/>
+        <p:spPr>
+          <a:xfrm>
+            <a:off x="1097280" y="266938"/>
+            <a:ext cx="10058400" cy="1450757"/>
+          </a:xfrm>
+        </p:spPr>
         <p:txBody>
           <a:bodyPr/>
           <a:lstStyle/>
@@ -5870,6 +8448,1062 @@
   <p:clrMapOvr>
     <a:masterClrMapping/>
   </p:clrMapOvr>
+</p:sld>
+</file>
+
+<file path=ppt/slides/slide6.xml><?xml version="1.0" encoding="utf-8"?>
+<p:sld xmlns:a="http://schemas.openxmlformats.org/drawingml/2006/main" xmlns:r="http://schemas.openxmlformats.org/officeDocument/2006/relationships" xmlns:p="http://schemas.openxmlformats.org/presentationml/2006/main">
+  <p:cSld>
+    <p:spTree>
+      <p:nvGrpSpPr>
+        <p:cNvPr id="1" name=""/>
+        <p:cNvGrpSpPr/>
+        <p:nvPr/>
+      </p:nvGrpSpPr>
+      <p:grpSpPr>
+        <a:xfrm>
+          <a:off x="0" y="0"/>
+          <a:ext cx="0" cy="0"/>
+          <a:chOff x="0" y="0"/>
+          <a:chExt cx="0" cy="0"/>
+        </a:xfrm>
+      </p:grpSpPr>
+      <p:sp>
+        <p:nvSpPr>
+          <p:cNvPr id="2" name="Título 1"/>
+          <p:cNvSpPr>
+            <a:spLocks noGrp="1"/>
+          </p:cNvSpPr>
+          <p:nvPr>
+            <p:ph type="ctrTitle"/>
+          </p:nvPr>
+        </p:nvSpPr>
+        <p:spPr/>
+        <p:txBody>
+          <a:bodyPr/>
+          <a:lstStyle/>
+          <a:p>
+            <a:r>
+              <a:rPr lang="es-ES" dirty="0" err="1" smtClean="0"/>
+              <a:t>Serialización</a:t>
+            </a:r>
+            <a:endParaRPr lang="es-CO" dirty="0"/>
+          </a:p>
+        </p:txBody>
+      </p:sp>
+      <p:sp>
+        <p:nvSpPr>
+          <p:cNvPr id="3" name="Subtítulo 2"/>
+          <p:cNvSpPr>
+            <a:spLocks noGrp="1"/>
+          </p:cNvSpPr>
+          <p:nvPr>
+            <p:ph type="subTitle" idx="1"/>
+          </p:nvPr>
+        </p:nvSpPr>
+        <p:spPr/>
+        <p:txBody>
+          <a:bodyPr/>
+          <a:lstStyle/>
+          <a:p>
+            <a:endParaRPr lang="es-ES" dirty="0" smtClean="0"/>
+          </a:p>
+        </p:txBody>
+      </p:sp>
+    </p:spTree>
+    <p:extLst>
+      <p:ext uri="{BB962C8B-B14F-4D97-AF65-F5344CB8AC3E}">
+        <p14:creationId xmlns:p14="http://schemas.microsoft.com/office/powerpoint/2010/main" val="526163314"/>
+      </p:ext>
+    </p:extLst>
+  </p:cSld>
+  <p:clrMapOvr>
+    <a:masterClrMapping/>
+  </p:clrMapOvr>
+  <p:timing>
+    <p:tnLst>
+      <p:par>
+        <p:cTn id="1" dur="indefinite" restart="never" nodeType="tmRoot"/>
+      </p:par>
+    </p:tnLst>
+  </p:timing>
+</p:sld>
+</file>
+
+<file path=ppt/slides/slide7.xml><?xml version="1.0" encoding="utf-8"?>
+<p:sld xmlns:a="http://schemas.openxmlformats.org/drawingml/2006/main" xmlns:r="http://schemas.openxmlformats.org/officeDocument/2006/relationships" xmlns:p="http://schemas.openxmlformats.org/presentationml/2006/main">
+  <p:cSld>
+    <p:spTree>
+      <p:nvGrpSpPr>
+        <p:cNvPr id="1" name=""/>
+        <p:cNvGrpSpPr/>
+        <p:nvPr/>
+      </p:nvGrpSpPr>
+      <p:grpSpPr>
+        <a:xfrm>
+          <a:off x="0" y="0"/>
+          <a:ext cx="0" cy="0"/>
+          <a:chOff x="0" y="0"/>
+          <a:chExt cx="0" cy="0"/>
+        </a:xfrm>
+      </p:grpSpPr>
+      <p:sp>
+        <p:nvSpPr>
+          <p:cNvPr id="2" name="Título 1"/>
+          <p:cNvSpPr>
+            <a:spLocks noGrp="1"/>
+          </p:cNvSpPr>
+          <p:nvPr>
+            <p:ph type="title"/>
+          </p:nvPr>
+        </p:nvSpPr>
+        <p:spPr/>
+        <p:txBody>
+          <a:bodyPr/>
+          <a:lstStyle/>
+          <a:p>
+            <a:r>
+              <a:rPr lang="es-ES" dirty="0" err="1" smtClean="0"/>
+              <a:t>Serialización</a:t>
+            </a:r>
+            <a:endParaRPr lang="es-CO" dirty="0"/>
+          </a:p>
+        </p:txBody>
+      </p:sp>
+      <p:sp>
+        <p:nvSpPr>
+          <p:cNvPr id="3" name="Marcador de contenido 2"/>
+          <p:cNvSpPr>
+            <a:spLocks noGrp="1"/>
+          </p:cNvSpPr>
+          <p:nvPr>
+            <p:ph idx="1"/>
+          </p:nvPr>
+        </p:nvSpPr>
+        <p:spPr>
+          <a:xfrm>
+            <a:off x="1097280" y="1845734"/>
+            <a:ext cx="5451004" cy="4023360"/>
+          </a:xfrm>
+        </p:spPr>
+        <p:txBody>
+          <a:bodyPr/>
+          <a:lstStyle/>
+          <a:p>
+            <a:r>
+              <a:rPr lang="es-ES" dirty="0" smtClean="0"/>
+              <a:t>Dentro de una conexión pueden intercambiarse Objetos.</a:t>
+            </a:r>
+          </a:p>
+          <a:p>
+            <a:r>
+              <a:rPr lang="es-ES" dirty="0" smtClean="0"/>
+              <a:t>Existen diversas propuestas para hacer dicha transferencia.</a:t>
+            </a:r>
+          </a:p>
+          <a:p>
+            <a:r>
+              <a:rPr lang="es-ES" dirty="0" smtClean="0"/>
+              <a:t>La forma estilo java involucra objetos de tipo </a:t>
+            </a:r>
+            <a:r>
+              <a:rPr lang="es-ES" dirty="0" err="1" smtClean="0"/>
+              <a:t>ObjectInputStream</a:t>
+            </a:r>
+            <a:r>
+              <a:rPr lang="es-ES" dirty="0" smtClean="0"/>
+              <a:t> y </a:t>
+            </a:r>
+            <a:r>
+              <a:rPr lang="es-ES" dirty="0" err="1" smtClean="0"/>
+              <a:t>ObjectOutputStream</a:t>
+            </a:r>
+            <a:r>
+              <a:rPr lang="es-ES" dirty="0" smtClean="0"/>
+              <a:t>.</a:t>
+            </a:r>
+            <a:endParaRPr lang="es-ES" dirty="0"/>
+          </a:p>
+        </p:txBody>
+      </p:sp>
+      <p:sp>
+        <p:nvSpPr>
+          <p:cNvPr id="14" name="Rectángulo 13"/>
+          <p:cNvSpPr/>
+          <p:nvPr/>
+        </p:nvSpPr>
+        <p:spPr>
+          <a:xfrm>
+            <a:off x="6932971" y="3051169"/>
+            <a:ext cx="1135626" cy="806245"/>
+          </a:xfrm>
+          <a:prstGeom prst="rect">
+            <a:avLst/>
+          </a:prstGeom>
+          <a:solidFill>
+            <a:srgbClr val="002060"/>
+          </a:solidFill>
+          <a:ln>
+            <a:solidFill>
+              <a:schemeClr val="tx1"/>
+            </a:solidFill>
+          </a:ln>
+        </p:spPr>
+        <p:style>
+          <a:lnRef idx="2">
+            <a:schemeClr val="accent1">
+              <a:shade val="50000"/>
+            </a:schemeClr>
+          </a:lnRef>
+          <a:fillRef idx="1">
+            <a:schemeClr val="accent1"/>
+          </a:fillRef>
+          <a:effectRef idx="0">
+            <a:schemeClr val="accent1"/>
+          </a:effectRef>
+          <a:fontRef idx="minor">
+            <a:schemeClr val="lt1"/>
+          </a:fontRef>
+        </p:style>
+        <p:txBody>
+          <a:bodyPr rtlCol="0" anchor="ctr"/>
+          <a:lstStyle/>
+          <a:p>
+            <a:pPr algn="ctr"/>
+            <a:r>
+              <a:rPr lang="es-ES" dirty="0" smtClean="0"/>
+              <a:t>A</a:t>
+            </a:r>
+            <a:endParaRPr lang="es-CO" dirty="0"/>
+          </a:p>
+        </p:txBody>
+      </p:sp>
+      <p:sp>
+        <p:nvSpPr>
+          <p:cNvPr id="15" name="Rectángulo 14"/>
+          <p:cNvSpPr/>
+          <p:nvPr/>
+        </p:nvSpPr>
+        <p:spPr>
+          <a:xfrm>
+            <a:off x="9874045" y="3051169"/>
+            <a:ext cx="1135626" cy="806245"/>
+          </a:xfrm>
+          <a:prstGeom prst="rect">
+            <a:avLst/>
+          </a:prstGeom>
+          <a:solidFill>
+            <a:srgbClr val="002060"/>
+          </a:solidFill>
+          <a:ln>
+            <a:solidFill>
+              <a:schemeClr val="tx1"/>
+            </a:solidFill>
+          </a:ln>
+        </p:spPr>
+        <p:style>
+          <a:lnRef idx="2">
+            <a:schemeClr val="accent1">
+              <a:shade val="50000"/>
+            </a:schemeClr>
+          </a:lnRef>
+          <a:fillRef idx="1">
+            <a:schemeClr val="accent1"/>
+          </a:fillRef>
+          <a:effectRef idx="0">
+            <a:schemeClr val="accent1"/>
+          </a:effectRef>
+          <a:fontRef idx="minor">
+            <a:schemeClr val="lt1"/>
+          </a:fontRef>
+        </p:style>
+        <p:txBody>
+          <a:bodyPr rtlCol="0" anchor="ctr"/>
+          <a:lstStyle/>
+          <a:p>
+            <a:pPr algn="ctr"/>
+            <a:r>
+              <a:rPr lang="es-ES" dirty="0" smtClean="0"/>
+              <a:t>B</a:t>
+            </a:r>
+            <a:endParaRPr lang="es-CO" dirty="0"/>
+          </a:p>
+        </p:txBody>
+      </p:sp>
+      <p:sp>
+        <p:nvSpPr>
+          <p:cNvPr id="8" name="Elipse 7"/>
+          <p:cNvSpPr/>
+          <p:nvPr/>
+        </p:nvSpPr>
+        <p:spPr>
+          <a:xfrm>
+            <a:off x="8068597" y="3311723"/>
+            <a:ext cx="285135" cy="285135"/>
+          </a:xfrm>
+          <a:prstGeom prst="ellipse">
+            <a:avLst/>
+          </a:prstGeom>
+        </p:spPr>
+        <p:style>
+          <a:lnRef idx="2">
+            <a:schemeClr val="accent1">
+              <a:shade val="50000"/>
+            </a:schemeClr>
+          </a:lnRef>
+          <a:fillRef idx="1">
+            <a:schemeClr val="accent1"/>
+          </a:fillRef>
+          <a:effectRef idx="0">
+            <a:schemeClr val="accent1"/>
+          </a:effectRef>
+          <a:fontRef idx="minor">
+            <a:schemeClr val="lt1"/>
+          </a:fontRef>
+        </p:style>
+        <p:txBody>
+          <a:bodyPr rtlCol="0" anchor="ctr"/>
+          <a:lstStyle/>
+          <a:p>
+            <a:pPr algn="ctr"/>
+            <a:endParaRPr lang="es-CO"/>
+          </a:p>
+        </p:txBody>
+      </p:sp>
+      <p:sp>
+        <p:nvSpPr>
+          <p:cNvPr id="16" name="Elipse 15"/>
+          <p:cNvSpPr/>
+          <p:nvPr/>
+        </p:nvSpPr>
+        <p:spPr>
+          <a:xfrm>
+            <a:off x="9599970" y="3311722"/>
+            <a:ext cx="285135" cy="285135"/>
+          </a:xfrm>
+          <a:prstGeom prst="ellipse">
+            <a:avLst/>
+          </a:prstGeom>
+        </p:spPr>
+        <p:style>
+          <a:lnRef idx="2">
+            <a:schemeClr val="accent1">
+              <a:shade val="50000"/>
+            </a:schemeClr>
+          </a:lnRef>
+          <a:fillRef idx="1">
+            <a:schemeClr val="accent1"/>
+          </a:fillRef>
+          <a:effectRef idx="0">
+            <a:schemeClr val="accent1"/>
+          </a:effectRef>
+          <a:fontRef idx="minor">
+            <a:schemeClr val="lt1"/>
+          </a:fontRef>
+        </p:style>
+        <p:txBody>
+          <a:bodyPr rtlCol="0" anchor="ctr"/>
+          <a:lstStyle/>
+          <a:p>
+            <a:pPr algn="ctr"/>
+            <a:endParaRPr lang="es-CO"/>
+          </a:p>
+        </p:txBody>
+      </p:sp>
+      <p:cxnSp>
+        <p:nvCxnSpPr>
+          <p:cNvPr id="18" name="Conector recto 17"/>
+          <p:cNvCxnSpPr>
+            <a:stCxn id="8" idx="6"/>
+            <a:endCxn id="16" idx="2"/>
+          </p:cNvCxnSpPr>
+          <p:nvPr/>
+        </p:nvCxnSpPr>
+        <p:spPr>
+          <a:xfrm flipV="1">
+            <a:off x="8353732" y="3454290"/>
+            <a:ext cx="1246238" cy="1"/>
+          </a:xfrm>
+          <a:prstGeom prst="line">
+            <a:avLst/>
+          </a:prstGeom>
+          <a:ln>
+            <a:solidFill>
+              <a:schemeClr val="tx1"/>
+            </a:solidFill>
+          </a:ln>
+        </p:spPr>
+        <p:style>
+          <a:lnRef idx="1">
+            <a:schemeClr val="accent1"/>
+          </a:lnRef>
+          <a:fillRef idx="0">
+            <a:schemeClr val="accent1"/>
+          </a:fillRef>
+          <a:effectRef idx="0">
+            <a:schemeClr val="accent1"/>
+          </a:effectRef>
+          <a:fontRef idx="minor">
+            <a:schemeClr val="tx1"/>
+          </a:fontRef>
+        </p:style>
+      </p:cxnSp>
+      <p:sp>
+        <p:nvSpPr>
+          <p:cNvPr id="19" name="CuadroTexto 18"/>
+          <p:cNvSpPr txBox="1"/>
+          <p:nvPr/>
+        </p:nvSpPr>
+        <p:spPr>
+          <a:xfrm>
+            <a:off x="9312992" y="4329362"/>
+            <a:ext cx="2054942" cy="383458"/>
+          </a:xfrm>
+          <a:prstGeom prst="rect">
+            <a:avLst/>
+          </a:prstGeom>
+          <a:noFill/>
+        </p:spPr>
+        <p:txBody>
+          <a:bodyPr wrap="square" rtlCol="0">
+            <a:spAutoFit/>
+          </a:bodyPr>
+          <a:lstStyle/>
+          <a:p>
+            <a:pPr algn="ctr"/>
+            <a:r>
+              <a:rPr lang="es-ES" dirty="0" err="1" smtClean="0"/>
+              <a:t>ObjectInputStream</a:t>
+            </a:r>
+            <a:endParaRPr lang="es-CO" dirty="0"/>
+          </a:p>
+        </p:txBody>
+      </p:sp>
+      <p:sp>
+        <p:nvSpPr>
+          <p:cNvPr id="20" name="CuadroTexto 19"/>
+          <p:cNvSpPr txBox="1"/>
+          <p:nvPr/>
+        </p:nvSpPr>
+        <p:spPr>
+          <a:xfrm>
+            <a:off x="6539404" y="4329361"/>
+            <a:ext cx="2207342" cy="369332"/>
+          </a:xfrm>
+          <a:prstGeom prst="rect">
+            <a:avLst/>
+          </a:prstGeom>
+          <a:noFill/>
+        </p:spPr>
+        <p:txBody>
+          <a:bodyPr wrap="square" rtlCol="0">
+            <a:spAutoFit/>
+          </a:bodyPr>
+          <a:lstStyle/>
+          <a:p>
+            <a:pPr algn="ctr"/>
+            <a:r>
+              <a:rPr lang="es-ES" dirty="0" err="1" smtClean="0"/>
+              <a:t>ObjectOutputStream</a:t>
+            </a:r>
+            <a:endParaRPr lang="es-CO" dirty="0"/>
+          </a:p>
+        </p:txBody>
+      </p:sp>
+      <p:cxnSp>
+        <p:nvCxnSpPr>
+          <p:cNvPr id="22" name="Conector recto de flecha 21"/>
+          <p:cNvCxnSpPr>
+            <a:stCxn id="8" idx="4"/>
+          </p:cNvCxnSpPr>
+          <p:nvPr/>
+        </p:nvCxnSpPr>
+        <p:spPr>
+          <a:xfrm flipH="1">
+            <a:off x="8211164" y="3596858"/>
+            <a:ext cx="1" cy="732504"/>
+          </a:xfrm>
+          <a:prstGeom prst="straightConnector1">
+            <a:avLst/>
+          </a:prstGeom>
+          <a:ln>
+            <a:tailEnd type="triangle"/>
+          </a:ln>
+        </p:spPr>
+        <p:style>
+          <a:lnRef idx="1">
+            <a:schemeClr val="accent1"/>
+          </a:lnRef>
+          <a:fillRef idx="0">
+            <a:schemeClr val="accent1"/>
+          </a:fillRef>
+          <a:effectRef idx="0">
+            <a:schemeClr val="accent1"/>
+          </a:effectRef>
+          <a:fontRef idx="minor">
+            <a:schemeClr val="tx1"/>
+          </a:fontRef>
+        </p:style>
+      </p:cxnSp>
+      <p:cxnSp>
+        <p:nvCxnSpPr>
+          <p:cNvPr id="23" name="Conector recto de flecha 22"/>
+          <p:cNvCxnSpPr/>
+          <p:nvPr/>
+        </p:nvCxnSpPr>
+        <p:spPr>
+          <a:xfrm flipH="1">
+            <a:off x="9738297" y="3596857"/>
+            <a:ext cx="1" cy="732504"/>
+          </a:xfrm>
+          <a:prstGeom prst="straightConnector1">
+            <a:avLst/>
+          </a:prstGeom>
+          <a:ln>
+            <a:tailEnd type="triangle"/>
+          </a:ln>
+        </p:spPr>
+        <p:style>
+          <a:lnRef idx="1">
+            <a:schemeClr val="accent1"/>
+          </a:lnRef>
+          <a:fillRef idx="0">
+            <a:schemeClr val="accent1"/>
+          </a:fillRef>
+          <a:effectRef idx="0">
+            <a:schemeClr val="accent1"/>
+          </a:effectRef>
+          <a:fontRef idx="minor">
+            <a:schemeClr val="tx1"/>
+          </a:fontRef>
+        </p:style>
+      </p:cxnSp>
+    </p:spTree>
+    <p:extLst>
+      <p:ext uri="{BB962C8B-B14F-4D97-AF65-F5344CB8AC3E}">
+        <p14:creationId xmlns:p14="http://schemas.microsoft.com/office/powerpoint/2010/main" val="370450482"/>
+      </p:ext>
+    </p:extLst>
+  </p:cSld>
+  <p:clrMapOvr>
+    <a:masterClrMapping/>
+  </p:clrMapOvr>
+</p:sld>
+</file>
+
+<file path=ppt/slides/slide8.xml><?xml version="1.0" encoding="utf-8"?>
+<p:sld xmlns:a="http://schemas.openxmlformats.org/drawingml/2006/main" xmlns:r="http://schemas.openxmlformats.org/officeDocument/2006/relationships" xmlns:p="http://schemas.openxmlformats.org/presentationml/2006/main">
+  <p:cSld>
+    <p:spTree>
+      <p:nvGrpSpPr>
+        <p:cNvPr id="1" name=""/>
+        <p:cNvGrpSpPr/>
+        <p:nvPr/>
+      </p:nvGrpSpPr>
+      <p:grpSpPr>
+        <a:xfrm>
+          <a:off x="0" y="0"/>
+          <a:ext cx="0" cy="0"/>
+          <a:chOff x="0" y="0"/>
+          <a:chExt cx="0" cy="0"/>
+        </a:xfrm>
+      </p:grpSpPr>
+      <p:sp>
+        <p:nvSpPr>
+          <p:cNvPr id="2" name="Título 1"/>
+          <p:cNvSpPr>
+            <a:spLocks noGrp="1"/>
+          </p:cNvSpPr>
+          <p:nvPr>
+            <p:ph type="title"/>
+          </p:nvPr>
+        </p:nvSpPr>
+        <p:spPr/>
+        <p:txBody>
+          <a:bodyPr/>
+          <a:lstStyle/>
+          <a:p>
+            <a:r>
+              <a:rPr lang="es-ES" dirty="0" err="1" smtClean="0"/>
+              <a:t>Serialización</a:t>
+            </a:r>
+            <a:endParaRPr lang="es-CO" dirty="0"/>
+          </a:p>
+        </p:txBody>
+      </p:sp>
+      <p:sp>
+        <p:nvSpPr>
+          <p:cNvPr id="3" name="Marcador de contenido 2"/>
+          <p:cNvSpPr>
+            <a:spLocks noGrp="1"/>
+          </p:cNvSpPr>
+          <p:nvPr>
+            <p:ph idx="1"/>
+          </p:nvPr>
+        </p:nvSpPr>
+        <p:spPr>
+          <a:xfrm>
+            <a:off x="1097280" y="1845734"/>
+            <a:ext cx="5451004" cy="4023360"/>
+          </a:xfrm>
+        </p:spPr>
+        <p:txBody>
+          <a:bodyPr/>
+          <a:lstStyle/>
+          <a:p>
+            <a:r>
+              <a:rPr lang="es-ES" dirty="0" smtClean="0"/>
+              <a:t>Otro acercamiento es convertir los objetos en texto de modo que se use un lenguaje estándar de intercambio de mensajes</a:t>
+            </a:r>
+          </a:p>
+          <a:p>
+            <a:r>
+              <a:rPr lang="es-ES" dirty="0" smtClean="0"/>
+              <a:t>Con esto se logra compatibilidad independientemente del lenguaje de programación.</a:t>
+            </a:r>
+            <a:endParaRPr lang="es-ES" dirty="0"/>
+          </a:p>
+        </p:txBody>
+      </p:sp>
+      <p:sp>
+        <p:nvSpPr>
+          <p:cNvPr id="14" name="Rectángulo 13"/>
+          <p:cNvSpPr/>
+          <p:nvPr/>
+        </p:nvSpPr>
+        <p:spPr>
+          <a:xfrm>
+            <a:off x="6932971" y="3051169"/>
+            <a:ext cx="1135626" cy="806245"/>
+          </a:xfrm>
+          <a:prstGeom prst="rect">
+            <a:avLst/>
+          </a:prstGeom>
+          <a:solidFill>
+            <a:srgbClr val="002060"/>
+          </a:solidFill>
+          <a:ln>
+            <a:solidFill>
+              <a:schemeClr val="tx1"/>
+            </a:solidFill>
+          </a:ln>
+        </p:spPr>
+        <p:style>
+          <a:lnRef idx="2">
+            <a:schemeClr val="accent1">
+              <a:shade val="50000"/>
+            </a:schemeClr>
+          </a:lnRef>
+          <a:fillRef idx="1">
+            <a:schemeClr val="accent1"/>
+          </a:fillRef>
+          <a:effectRef idx="0">
+            <a:schemeClr val="accent1"/>
+          </a:effectRef>
+          <a:fontRef idx="minor">
+            <a:schemeClr val="lt1"/>
+          </a:fontRef>
+        </p:style>
+        <p:txBody>
+          <a:bodyPr rtlCol="0" anchor="ctr"/>
+          <a:lstStyle/>
+          <a:p>
+            <a:pPr algn="ctr"/>
+            <a:r>
+              <a:rPr lang="es-ES" dirty="0" smtClean="0"/>
+              <a:t>A</a:t>
+            </a:r>
+            <a:endParaRPr lang="es-CO" dirty="0"/>
+          </a:p>
+        </p:txBody>
+      </p:sp>
+      <p:sp>
+        <p:nvSpPr>
+          <p:cNvPr id="15" name="Rectángulo 14"/>
+          <p:cNvSpPr/>
+          <p:nvPr/>
+        </p:nvSpPr>
+        <p:spPr>
+          <a:xfrm>
+            <a:off x="9874045" y="3051169"/>
+            <a:ext cx="1135626" cy="806245"/>
+          </a:xfrm>
+          <a:prstGeom prst="rect">
+            <a:avLst/>
+          </a:prstGeom>
+          <a:solidFill>
+            <a:srgbClr val="002060"/>
+          </a:solidFill>
+          <a:ln>
+            <a:solidFill>
+              <a:schemeClr val="tx1"/>
+            </a:solidFill>
+          </a:ln>
+        </p:spPr>
+        <p:style>
+          <a:lnRef idx="2">
+            <a:schemeClr val="accent1">
+              <a:shade val="50000"/>
+            </a:schemeClr>
+          </a:lnRef>
+          <a:fillRef idx="1">
+            <a:schemeClr val="accent1"/>
+          </a:fillRef>
+          <a:effectRef idx="0">
+            <a:schemeClr val="accent1"/>
+          </a:effectRef>
+          <a:fontRef idx="minor">
+            <a:schemeClr val="lt1"/>
+          </a:fontRef>
+        </p:style>
+        <p:txBody>
+          <a:bodyPr rtlCol="0" anchor="ctr"/>
+          <a:lstStyle/>
+          <a:p>
+            <a:pPr algn="ctr"/>
+            <a:r>
+              <a:rPr lang="es-ES" dirty="0" smtClean="0"/>
+              <a:t>B</a:t>
+            </a:r>
+            <a:endParaRPr lang="es-CO" dirty="0"/>
+          </a:p>
+        </p:txBody>
+      </p:sp>
+      <p:sp>
+        <p:nvSpPr>
+          <p:cNvPr id="8" name="Elipse 7"/>
+          <p:cNvSpPr/>
+          <p:nvPr/>
+        </p:nvSpPr>
+        <p:spPr>
+          <a:xfrm>
+            <a:off x="7028835" y="3098580"/>
+            <a:ext cx="285135" cy="285135"/>
+          </a:xfrm>
+          <a:prstGeom prst="ellipse">
+            <a:avLst/>
+          </a:prstGeom>
+        </p:spPr>
+        <p:style>
+          <a:lnRef idx="2">
+            <a:schemeClr val="accent1">
+              <a:shade val="50000"/>
+            </a:schemeClr>
+          </a:lnRef>
+          <a:fillRef idx="1">
+            <a:schemeClr val="accent1"/>
+          </a:fillRef>
+          <a:effectRef idx="0">
+            <a:schemeClr val="accent1"/>
+          </a:effectRef>
+          <a:fontRef idx="minor">
+            <a:schemeClr val="lt1"/>
+          </a:fontRef>
+        </p:style>
+        <p:txBody>
+          <a:bodyPr rtlCol="0" anchor="ctr"/>
+          <a:lstStyle/>
+          <a:p>
+            <a:pPr algn="ctr"/>
+            <a:endParaRPr lang="es-CO"/>
+          </a:p>
+        </p:txBody>
+      </p:sp>
+      <p:sp>
+        <p:nvSpPr>
+          <p:cNvPr id="16" name="Elipse 15"/>
+          <p:cNvSpPr/>
+          <p:nvPr/>
+        </p:nvSpPr>
+        <p:spPr>
+          <a:xfrm>
+            <a:off x="10724536" y="3101832"/>
+            <a:ext cx="285135" cy="285135"/>
+          </a:xfrm>
+          <a:prstGeom prst="ellipse">
+            <a:avLst/>
+          </a:prstGeom>
+        </p:spPr>
+        <p:style>
+          <a:lnRef idx="2">
+            <a:schemeClr val="accent1">
+              <a:shade val="50000"/>
+            </a:schemeClr>
+          </a:lnRef>
+          <a:fillRef idx="1">
+            <a:schemeClr val="accent1"/>
+          </a:fillRef>
+          <a:effectRef idx="0">
+            <a:schemeClr val="accent1"/>
+          </a:effectRef>
+          <a:fontRef idx="minor">
+            <a:schemeClr val="lt1"/>
+          </a:fontRef>
+        </p:style>
+        <p:txBody>
+          <a:bodyPr rtlCol="0" anchor="ctr"/>
+          <a:lstStyle/>
+          <a:p>
+            <a:pPr algn="ctr"/>
+            <a:endParaRPr lang="es-CO"/>
+          </a:p>
+        </p:txBody>
+      </p:sp>
+      <p:cxnSp>
+        <p:nvCxnSpPr>
+          <p:cNvPr id="18" name="Conector recto 17"/>
+          <p:cNvCxnSpPr>
+            <a:stCxn id="14" idx="3"/>
+            <a:endCxn id="15" idx="1"/>
+          </p:cNvCxnSpPr>
+          <p:nvPr/>
+        </p:nvCxnSpPr>
+        <p:spPr>
+          <a:xfrm>
+            <a:off x="8068597" y="3454292"/>
+            <a:ext cx="1805448" cy="0"/>
+          </a:xfrm>
+          <a:prstGeom prst="line">
+            <a:avLst/>
+          </a:prstGeom>
+          <a:ln>
+            <a:solidFill>
+              <a:schemeClr val="tx1"/>
+            </a:solidFill>
+          </a:ln>
+        </p:spPr>
+        <p:style>
+          <a:lnRef idx="1">
+            <a:schemeClr val="accent1"/>
+          </a:lnRef>
+          <a:fillRef idx="0">
+            <a:schemeClr val="accent1"/>
+          </a:fillRef>
+          <a:effectRef idx="0">
+            <a:schemeClr val="accent1"/>
+          </a:effectRef>
+          <a:fontRef idx="minor">
+            <a:schemeClr val="tx1"/>
+          </a:fontRef>
+        </p:style>
+      </p:cxnSp>
+      <p:sp>
+        <p:nvSpPr>
+          <p:cNvPr id="20" name="CuadroTexto 19"/>
+          <p:cNvSpPr txBox="1"/>
+          <p:nvPr/>
+        </p:nvSpPr>
+        <p:spPr>
+          <a:xfrm>
+            <a:off x="6548284" y="4186879"/>
+            <a:ext cx="2207342" cy="923330"/>
+          </a:xfrm>
+          <a:prstGeom prst="rect">
+            <a:avLst/>
+          </a:prstGeom>
+          <a:noFill/>
+        </p:spPr>
+        <p:txBody>
+          <a:bodyPr wrap="square" rtlCol="0">
+            <a:spAutoFit/>
+          </a:bodyPr>
+          <a:lstStyle/>
+          <a:p>
+            <a:pPr algn="ctr"/>
+            <a:r>
+              <a:rPr lang="es-ES" dirty="0" smtClean="0"/>
+              <a:t>Escritor e intérprete del lenguaje de intercambio de datos</a:t>
+            </a:r>
+            <a:endParaRPr lang="es-CO" dirty="0"/>
+          </a:p>
+        </p:txBody>
+      </p:sp>
+      <p:cxnSp>
+        <p:nvCxnSpPr>
+          <p:cNvPr id="22" name="Conector recto de flecha 21"/>
+          <p:cNvCxnSpPr/>
+          <p:nvPr/>
+        </p:nvCxnSpPr>
+        <p:spPr>
+          <a:xfrm flipH="1">
+            <a:off x="7171401" y="3386172"/>
+            <a:ext cx="1" cy="732504"/>
+          </a:xfrm>
+          <a:prstGeom prst="straightConnector1">
+            <a:avLst/>
+          </a:prstGeom>
+          <a:ln>
+            <a:tailEnd type="triangle"/>
+          </a:ln>
+        </p:spPr>
+        <p:style>
+          <a:lnRef idx="1">
+            <a:schemeClr val="accent1"/>
+          </a:lnRef>
+          <a:fillRef idx="0">
+            <a:schemeClr val="accent1"/>
+          </a:fillRef>
+          <a:effectRef idx="0">
+            <a:schemeClr val="accent1"/>
+          </a:effectRef>
+          <a:fontRef idx="minor">
+            <a:schemeClr val="tx1"/>
+          </a:fontRef>
+        </p:style>
+      </p:cxnSp>
+      <p:cxnSp>
+        <p:nvCxnSpPr>
+          <p:cNvPr id="23" name="Conector recto de flecha 22"/>
+          <p:cNvCxnSpPr/>
+          <p:nvPr/>
+        </p:nvCxnSpPr>
+        <p:spPr>
+          <a:xfrm flipH="1">
+            <a:off x="10862863" y="3386967"/>
+            <a:ext cx="1" cy="732504"/>
+          </a:xfrm>
+          <a:prstGeom prst="straightConnector1">
+            <a:avLst/>
+          </a:prstGeom>
+          <a:ln>
+            <a:tailEnd type="triangle"/>
+          </a:ln>
+        </p:spPr>
+        <p:style>
+          <a:lnRef idx="1">
+            <a:schemeClr val="accent1"/>
+          </a:lnRef>
+          <a:fillRef idx="0">
+            <a:schemeClr val="accent1"/>
+          </a:fillRef>
+          <a:effectRef idx="0">
+            <a:schemeClr val="accent1"/>
+          </a:effectRef>
+          <a:fontRef idx="minor">
+            <a:schemeClr val="tx1"/>
+          </a:fontRef>
+        </p:style>
+      </p:cxnSp>
+      <p:sp>
+        <p:nvSpPr>
+          <p:cNvPr id="21" name="CuadroTexto 20"/>
+          <p:cNvSpPr txBox="1"/>
+          <p:nvPr/>
+        </p:nvSpPr>
+        <p:spPr>
+          <a:xfrm>
+            <a:off x="9109587" y="4186879"/>
+            <a:ext cx="2207342" cy="923330"/>
+          </a:xfrm>
+          <a:prstGeom prst="rect">
+            <a:avLst/>
+          </a:prstGeom>
+          <a:noFill/>
+        </p:spPr>
+        <p:txBody>
+          <a:bodyPr wrap="square" rtlCol="0">
+            <a:spAutoFit/>
+          </a:bodyPr>
+          <a:lstStyle/>
+          <a:p>
+            <a:pPr algn="ctr"/>
+            <a:r>
+              <a:rPr lang="es-ES" dirty="0" smtClean="0"/>
+              <a:t>Escritor e intérprete del lenguaje de intercambio de datos</a:t>
+            </a:r>
+            <a:endParaRPr lang="es-CO" dirty="0"/>
+          </a:p>
+        </p:txBody>
+      </p:sp>
+    </p:spTree>
+    <p:extLst>
+      <p:ext uri="{BB962C8B-B14F-4D97-AF65-F5344CB8AC3E}">
+        <p14:creationId xmlns:p14="http://schemas.microsoft.com/office/powerpoint/2010/main" val="1470084002"/>
+      </p:ext>
+    </p:extLst>
+  </p:cSld>
+  <p:clrMapOvr>
+    <a:masterClrMapping/>
+  </p:clrMapOvr>
+</p:sld>
+</file>
+
+<file path=ppt/slides/slide9.xml><?xml version="1.0" encoding="utf-8"?>
+<p:sld xmlns:a="http://schemas.openxmlformats.org/drawingml/2006/main" xmlns:r="http://schemas.openxmlformats.org/officeDocument/2006/relationships" xmlns:p="http://schemas.openxmlformats.org/presentationml/2006/main">
+  <p:cSld>
+    <p:spTree>
+      <p:nvGrpSpPr>
+        <p:cNvPr id="1" name=""/>
+        <p:cNvGrpSpPr/>
+        <p:nvPr/>
+      </p:nvGrpSpPr>
+      <p:grpSpPr>
+        <a:xfrm>
+          <a:off x="0" y="0"/>
+          <a:ext cx="0" cy="0"/>
+          <a:chOff x="0" y="0"/>
+          <a:chExt cx="0" cy="0"/>
+        </a:xfrm>
+      </p:grpSpPr>
+      <p:sp>
+        <p:nvSpPr>
+          <p:cNvPr id="2" name="Título 1"/>
+          <p:cNvSpPr>
+            <a:spLocks noGrp="1"/>
+          </p:cNvSpPr>
+          <p:nvPr>
+            <p:ph type="ctrTitle"/>
+          </p:nvPr>
+        </p:nvSpPr>
+        <p:spPr/>
+        <p:txBody>
+          <a:bodyPr/>
+          <a:lstStyle/>
+          <a:p>
+            <a:r>
+              <a:rPr lang="es-ES" dirty="0" smtClean="0"/>
+              <a:t>JSON</a:t>
+            </a:r>
+            <a:endParaRPr lang="es-CO" dirty="0"/>
+          </a:p>
+        </p:txBody>
+      </p:sp>
+      <p:sp>
+        <p:nvSpPr>
+          <p:cNvPr id="3" name="Subtítulo 2"/>
+          <p:cNvSpPr>
+            <a:spLocks noGrp="1"/>
+          </p:cNvSpPr>
+          <p:nvPr>
+            <p:ph type="subTitle" idx="1"/>
+          </p:nvPr>
+        </p:nvSpPr>
+        <p:spPr/>
+        <p:txBody>
+          <a:bodyPr/>
+          <a:lstStyle/>
+          <a:p>
+            <a:endParaRPr lang="es-ES" dirty="0" smtClean="0"/>
+          </a:p>
+        </p:txBody>
+      </p:sp>
+    </p:spTree>
+    <p:extLst>
+      <p:ext uri="{BB962C8B-B14F-4D97-AF65-F5344CB8AC3E}">
+        <p14:creationId xmlns:p14="http://schemas.microsoft.com/office/powerpoint/2010/main" val="2676002886"/>
+      </p:ext>
+    </p:extLst>
+  </p:cSld>
+  <p:clrMapOvr>
+    <a:masterClrMapping/>
+  </p:clrMapOvr>
+  <p:timing>
+    <p:tnLst>
+      <p:par>
+        <p:cTn id="1" dur="indefinite" restart="never" nodeType="tmRoot"/>
+      </p:par>
+    </p:tnLst>
+  </p:timing>
 </p:sld>
 </file>
 

</xml_diff>